<commit_message>
re-processed the output files with release from the surface
slides updated
</commit_message>
<xml_diff>
--- a/bayesian.pptx
+++ b/bayesian.pptx
@@ -4,10 +4,22 @@
   <p:sldMasterIdLst>
     <p:sldMasterId id="2147483648" r:id="rId1"/>
   </p:sldMasterIdLst>
+  <p:notesMasterIdLst>
+    <p:notesMasterId r:id="rId14"/>
+  </p:notesMasterIdLst>
   <p:sldIdLst>
     <p:sldId id="256" r:id="rId2"/>
-    <p:sldId id="257" r:id="rId3"/>
-    <p:sldId id="258" r:id="rId4"/>
+    <p:sldId id="259" r:id="rId3"/>
+    <p:sldId id="260" r:id="rId4"/>
+    <p:sldId id="261" r:id="rId5"/>
+    <p:sldId id="264" r:id="rId6"/>
+    <p:sldId id="257" r:id="rId7"/>
+    <p:sldId id="258" r:id="rId8"/>
+    <p:sldId id="263" r:id="rId9"/>
+    <p:sldId id="265" r:id="rId10"/>
+    <p:sldId id="266" r:id="rId11"/>
+    <p:sldId id="262" r:id="rId12"/>
+    <p:sldId id="267" r:id="rId13"/>
   </p:sldIdLst>
   <p:sldSz cx="12192000" cy="6858000"/>
   <p:notesSz cx="6858000" cy="9144000"/>
@@ -114,6 +126,523 @@
 </p:presentation>
 </file>
 
+<file path=ppt/notesMasters/notesMaster1.xml><?xml version="1.0" encoding="utf-8"?>
+<p:notesMaster xmlns:a="http://schemas.openxmlformats.org/drawingml/2006/main" xmlns:r="http://schemas.openxmlformats.org/officeDocument/2006/relationships" xmlns:p="http://schemas.openxmlformats.org/presentationml/2006/main">
+  <p:cSld>
+    <p:bg>
+      <p:bgRef idx="1001">
+        <a:schemeClr val="bg1"/>
+      </p:bgRef>
+    </p:bg>
+    <p:spTree>
+      <p:nvGrpSpPr>
+        <p:cNvPr id="1" name=""/>
+        <p:cNvGrpSpPr/>
+        <p:nvPr/>
+      </p:nvGrpSpPr>
+      <p:grpSpPr>
+        <a:xfrm>
+          <a:off x="0" y="0"/>
+          <a:ext cx="0" cy="0"/>
+          <a:chOff x="0" y="0"/>
+          <a:chExt cx="0" cy="0"/>
+        </a:xfrm>
+      </p:grpSpPr>
+      <p:sp>
+        <p:nvSpPr>
+          <p:cNvPr id="2" name="Header Placeholder 1"/>
+          <p:cNvSpPr>
+            <a:spLocks noGrp="1"/>
+          </p:cNvSpPr>
+          <p:nvPr>
+            <p:ph type="hdr" sz="quarter"/>
+          </p:nvPr>
+        </p:nvSpPr>
+        <p:spPr>
+          <a:xfrm>
+            <a:off x="0" y="0"/>
+            <a:ext cx="2971800" cy="458788"/>
+          </a:xfrm>
+          <a:prstGeom prst="rect">
+            <a:avLst/>
+          </a:prstGeom>
+        </p:spPr>
+        <p:txBody>
+          <a:bodyPr vert="horz" lIns="91440" tIns="45720" rIns="91440" bIns="45720" rtlCol="0"/>
+          <a:lstStyle>
+            <a:lvl1pPr algn="l">
+              <a:defRPr sz="1200"/>
+            </a:lvl1pPr>
+          </a:lstStyle>
+          <a:p>
+            <a:endParaRPr lang="en-US"/>
+          </a:p>
+        </p:txBody>
+      </p:sp>
+      <p:sp>
+        <p:nvSpPr>
+          <p:cNvPr id="3" name="Date Placeholder 2"/>
+          <p:cNvSpPr>
+            <a:spLocks noGrp="1"/>
+          </p:cNvSpPr>
+          <p:nvPr>
+            <p:ph type="dt" idx="1"/>
+          </p:nvPr>
+        </p:nvSpPr>
+        <p:spPr>
+          <a:xfrm>
+            <a:off x="3884613" y="0"/>
+            <a:ext cx="2971800" cy="458788"/>
+          </a:xfrm>
+          <a:prstGeom prst="rect">
+            <a:avLst/>
+          </a:prstGeom>
+        </p:spPr>
+        <p:txBody>
+          <a:bodyPr vert="horz" lIns="91440" tIns="45720" rIns="91440" bIns="45720" rtlCol="0"/>
+          <a:lstStyle>
+            <a:lvl1pPr algn="r">
+              <a:defRPr sz="1200"/>
+            </a:lvl1pPr>
+          </a:lstStyle>
+          <a:p>
+            <a:fld id="{1B55C052-9DFF-0540-A4A0-56E775174C83}" type="datetimeFigureOut">
+              <a:rPr lang="en-US" smtClean="0"/>
+              <a:t>3/6/21</a:t>
+            </a:fld>
+            <a:endParaRPr lang="en-US"/>
+          </a:p>
+        </p:txBody>
+      </p:sp>
+      <p:sp>
+        <p:nvSpPr>
+          <p:cNvPr id="4" name="Slide Image Placeholder 3"/>
+          <p:cNvSpPr>
+            <a:spLocks noGrp="1" noRot="1" noChangeAspect="1"/>
+          </p:cNvSpPr>
+          <p:nvPr>
+            <p:ph type="sldImg" idx="2"/>
+          </p:nvPr>
+        </p:nvSpPr>
+        <p:spPr>
+          <a:xfrm>
+            <a:off x="685800" y="1143000"/>
+            <a:ext cx="5486400" cy="3086100"/>
+          </a:xfrm>
+          <a:prstGeom prst="rect">
+            <a:avLst/>
+          </a:prstGeom>
+          <a:noFill/>
+          <a:ln w="12700">
+            <a:solidFill>
+              <a:prstClr val="black"/>
+            </a:solidFill>
+          </a:ln>
+        </p:spPr>
+        <p:txBody>
+          <a:bodyPr vert="horz" lIns="91440" tIns="45720" rIns="91440" bIns="45720" rtlCol="0" anchor="ctr"/>
+          <a:lstStyle/>
+          <a:p>
+            <a:endParaRPr lang="en-US"/>
+          </a:p>
+        </p:txBody>
+      </p:sp>
+      <p:sp>
+        <p:nvSpPr>
+          <p:cNvPr id="5" name="Notes Placeholder 4"/>
+          <p:cNvSpPr>
+            <a:spLocks noGrp="1"/>
+          </p:cNvSpPr>
+          <p:nvPr>
+            <p:ph type="body" sz="quarter" idx="3"/>
+          </p:nvPr>
+        </p:nvSpPr>
+        <p:spPr>
+          <a:xfrm>
+            <a:off x="685800" y="4400550"/>
+            <a:ext cx="5486400" cy="3600450"/>
+          </a:xfrm>
+          <a:prstGeom prst="rect">
+            <a:avLst/>
+          </a:prstGeom>
+        </p:spPr>
+        <p:txBody>
+          <a:bodyPr vert="horz" lIns="91440" tIns="45720" rIns="91440" bIns="45720" rtlCol="0"/>
+          <a:lstStyle/>
+          <a:p>
+            <a:pPr lvl="0"/>
+            <a:r>
+              <a:rPr lang="en-US"/>
+              <a:t>Click to edit Master text styles</a:t>
+            </a:r>
+          </a:p>
+          <a:p>
+            <a:pPr lvl="1"/>
+            <a:r>
+              <a:rPr lang="en-US"/>
+              <a:t>Second level</a:t>
+            </a:r>
+          </a:p>
+          <a:p>
+            <a:pPr lvl="2"/>
+            <a:r>
+              <a:rPr lang="en-US"/>
+              <a:t>Third level</a:t>
+            </a:r>
+          </a:p>
+          <a:p>
+            <a:pPr lvl="3"/>
+            <a:r>
+              <a:rPr lang="en-US"/>
+              <a:t>Fourth level</a:t>
+            </a:r>
+          </a:p>
+          <a:p>
+            <a:pPr lvl="4"/>
+            <a:r>
+              <a:rPr lang="en-US"/>
+              <a:t>Fifth level</a:t>
+            </a:r>
+          </a:p>
+        </p:txBody>
+      </p:sp>
+      <p:sp>
+        <p:nvSpPr>
+          <p:cNvPr id="6" name="Footer Placeholder 5"/>
+          <p:cNvSpPr>
+            <a:spLocks noGrp="1"/>
+          </p:cNvSpPr>
+          <p:nvPr>
+            <p:ph type="ftr" sz="quarter" idx="4"/>
+          </p:nvPr>
+        </p:nvSpPr>
+        <p:spPr>
+          <a:xfrm>
+            <a:off x="0" y="8685213"/>
+            <a:ext cx="2971800" cy="458787"/>
+          </a:xfrm>
+          <a:prstGeom prst="rect">
+            <a:avLst/>
+          </a:prstGeom>
+        </p:spPr>
+        <p:txBody>
+          <a:bodyPr vert="horz" lIns="91440" tIns="45720" rIns="91440" bIns="45720" rtlCol="0" anchor="b"/>
+          <a:lstStyle>
+            <a:lvl1pPr algn="l">
+              <a:defRPr sz="1200"/>
+            </a:lvl1pPr>
+          </a:lstStyle>
+          <a:p>
+            <a:endParaRPr lang="en-US"/>
+          </a:p>
+        </p:txBody>
+      </p:sp>
+      <p:sp>
+        <p:nvSpPr>
+          <p:cNvPr id="7" name="Slide Number Placeholder 6"/>
+          <p:cNvSpPr>
+            <a:spLocks noGrp="1"/>
+          </p:cNvSpPr>
+          <p:nvPr>
+            <p:ph type="sldNum" sz="quarter" idx="5"/>
+          </p:nvPr>
+        </p:nvSpPr>
+        <p:spPr>
+          <a:xfrm>
+            <a:off x="3884613" y="8685213"/>
+            <a:ext cx="2971800" cy="458787"/>
+          </a:xfrm>
+          <a:prstGeom prst="rect">
+            <a:avLst/>
+          </a:prstGeom>
+        </p:spPr>
+        <p:txBody>
+          <a:bodyPr vert="horz" lIns="91440" tIns="45720" rIns="91440" bIns="45720" rtlCol="0" anchor="b"/>
+          <a:lstStyle>
+            <a:lvl1pPr algn="r">
+              <a:defRPr sz="1200"/>
+            </a:lvl1pPr>
+          </a:lstStyle>
+          <a:p>
+            <a:fld id="{D8012ECC-3B28-B646-84D5-C4078AE4DBC5}" type="slidenum">
+              <a:rPr lang="en-US" smtClean="0"/>
+              <a:t>‹#›</a:t>
+            </a:fld>
+            <a:endParaRPr lang="en-US"/>
+          </a:p>
+        </p:txBody>
+      </p:sp>
+    </p:spTree>
+    <p:extLst>
+      <p:ext uri="{BB962C8B-B14F-4D97-AF65-F5344CB8AC3E}">
+        <p14:creationId xmlns:p14="http://schemas.microsoft.com/office/powerpoint/2010/main" val="3516196275"/>
+      </p:ext>
+    </p:extLst>
+  </p:cSld>
+  <p:clrMap bg1="lt1" tx1="dk1" bg2="lt2" tx2="dk2" accent1="accent1" accent2="accent2" accent3="accent3" accent4="accent4" accent5="accent5" accent6="accent6" hlink="hlink" folHlink="folHlink"/>
+  <p:notesStyle>
+    <a:lvl1pPr marL="0" algn="l" defTabSz="914400" rtl="0" eaLnBrk="1" latinLnBrk="0" hangingPunct="1">
+      <a:defRPr sz="1200" kern="1200">
+        <a:solidFill>
+          <a:schemeClr val="tx1"/>
+        </a:solidFill>
+        <a:latin typeface="+mn-lt"/>
+        <a:ea typeface="+mn-ea"/>
+        <a:cs typeface="+mn-cs"/>
+      </a:defRPr>
+    </a:lvl1pPr>
+    <a:lvl2pPr marL="457200" algn="l" defTabSz="914400" rtl="0" eaLnBrk="1" latinLnBrk="0" hangingPunct="1">
+      <a:defRPr sz="1200" kern="1200">
+        <a:solidFill>
+          <a:schemeClr val="tx1"/>
+        </a:solidFill>
+        <a:latin typeface="+mn-lt"/>
+        <a:ea typeface="+mn-ea"/>
+        <a:cs typeface="+mn-cs"/>
+      </a:defRPr>
+    </a:lvl2pPr>
+    <a:lvl3pPr marL="914400" algn="l" defTabSz="914400" rtl="0" eaLnBrk="1" latinLnBrk="0" hangingPunct="1">
+      <a:defRPr sz="1200" kern="1200">
+        <a:solidFill>
+          <a:schemeClr val="tx1"/>
+        </a:solidFill>
+        <a:latin typeface="+mn-lt"/>
+        <a:ea typeface="+mn-ea"/>
+        <a:cs typeface="+mn-cs"/>
+      </a:defRPr>
+    </a:lvl3pPr>
+    <a:lvl4pPr marL="1371600" algn="l" defTabSz="914400" rtl="0" eaLnBrk="1" latinLnBrk="0" hangingPunct="1">
+      <a:defRPr sz="1200" kern="1200">
+        <a:solidFill>
+          <a:schemeClr val="tx1"/>
+        </a:solidFill>
+        <a:latin typeface="+mn-lt"/>
+        <a:ea typeface="+mn-ea"/>
+        <a:cs typeface="+mn-cs"/>
+      </a:defRPr>
+    </a:lvl4pPr>
+    <a:lvl5pPr marL="1828800" algn="l" defTabSz="914400" rtl="0" eaLnBrk="1" latinLnBrk="0" hangingPunct="1">
+      <a:defRPr sz="1200" kern="1200">
+        <a:solidFill>
+          <a:schemeClr val="tx1"/>
+        </a:solidFill>
+        <a:latin typeface="+mn-lt"/>
+        <a:ea typeface="+mn-ea"/>
+        <a:cs typeface="+mn-cs"/>
+      </a:defRPr>
+    </a:lvl5pPr>
+    <a:lvl6pPr marL="2286000" algn="l" defTabSz="914400" rtl="0" eaLnBrk="1" latinLnBrk="0" hangingPunct="1">
+      <a:defRPr sz="1200" kern="1200">
+        <a:solidFill>
+          <a:schemeClr val="tx1"/>
+        </a:solidFill>
+        <a:latin typeface="+mn-lt"/>
+        <a:ea typeface="+mn-ea"/>
+        <a:cs typeface="+mn-cs"/>
+      </a:defRPr>
+    </a:lvl6pPr>
+    <a:lvl7pPr marL="2743200" algn="l" defTabSz="914400" rtl="0" eaLnBrk="1" latinLnBrk="0" hangingPunct="1">
+      <a:defRPr sz="1200" kern="1200">
+        <a:solidFill>
+          <a:schemeClr val="tx1"/>
+        </a:solidFill>
+        <a:latin typeface="+mn-lt"/>
+        <a:ea typeface="+mn-ea"/>
+        <a:cs typeface="+mn-cs"/>
+      </a:defRPr>
+    </a:lvl7pPr>
+    <a:lvl8pPr marL="3200400" algn="l" defTabSz="914400" rtl="0" eaLnBrk="1" latinLnBrk="0" hangingPunct="1">
+      <a:defRPr sz="1200" kern="1200">
+        <a:solidFill>
+          <a:schemeClr val="tx1"/>
+        </a:solidFill>
+        <a:latin typeface="+mn-lt"/>
+        <a:ea typeface="+mn-ea"/>
+        <a:cs typeface="+mn-cs"/>
+      </a:defRPr>
+    </a:lvl8pPr>
+    <a:lvl9pPr marL="3657600" algn="l" defTabSz="914400" rtl="0" eaLnBrk="1" latinLnBrk="0" hangingPunct="1">
+      <a:defRPr sz="1200" kern="1200">
+        <a:solidFill>
+          <a:schemeClr val="tx1"/>
+        </a:solidFill>
+        <a:latin typeface="+mn-lt"/>
+        <a:ea typeface="+mn-ea"/>
+        <a:cs typeface="+mn-cs"/>
+      </a:defRPr>
+    </a:lvl9pPr>
+  </p:notesStyle>
+</p:notesMaster>
+</file>
+
+<file path=ppt/notesSlides/notesSlide1.xml><?xml version="1.0" encoding="utf-8"?>
+<p:notes xmlns:a="http://schemas.openxmlformats.org/drawingml/2006/main" xmlns:r="http://schemas.openxmlformats.org/officeDocument/2006/relationships" xmlns:p="http://schemas.openxmlformats.org/presentationml/2006/main">
+  <p:cSld>
+    <p:spTree>
+      <p:nvGrpSpPr>
+        <p:cNvPr id="1" name=""/>
+        <p:cNvGrpSpPr/>
+        <p:nvPr/>
+      </p:nvGrpSpPr>
+      <p:grpSpPr>
+        <a:xfrm>
+          <a:off x="0" y="0"/>
+          <a:ext cx="0" cy="0"/>
+          <a:chOff x="0" y="0"/>
+          <a:chExt cx="0" cy="0"/>
+        </a:xfrm>
+      </p:grpSpPr>
+      <p:sp>
+        <p:nvSpPr>
+          <p:cNvPr id="2" name="Slide Image Placeholder 1"/>
+          <p:cNvSpPr>
+            <a:spLocks noGrp="1" noRot="1" noChangeAspect="1"/>
+          </p:cNvSpPr>
+          <p:nvPr>
+            <p:ph type="sldImg"/>
+          </p:nvPr>
+        </p:nvSpPr>
+        <p:spPr/>
+      </p:sp>
+      <p:sp>
+        <p:nvSpPr>
+          <p:cNvPr id="3" name="Notes Placeholder 2"/>
+          <p:cNvSpPr>
+            <a:spLocks noGrp="1"/>
+          </p:cNvSpPr>
+          <p:nvPr>
+            <p:ph type="body" idx="1"/>
+          </p:nvPr>
+        </p:nvSpPr>
+        <p:spPr/>
+        <p:txBody>
+          <a:bodyPr/>
+          <a:lstStyle/>
+          <a:p>
+            <a:endParaRPr lang="en-US" dirty="0"/>
+          </a:p>
+        </p:txBody>
+      </p:sp>
+      <p:sp>
+        <p:nvSpPr>
+          <p:cNvPr id="4" name="Slide Number Placeholder 3"/>
+          <p:cNvSpPr>
+            <a:spLocks noGrp="1"/>
+          </p:cNvSpPr>
+          <p:nvPr>
+            <p:ph type="sldNum" sz="quarter" idx="5"/>
+          </p:nvPr>
+        </p:nvSpPr>
+        <p:spPr/>
+        <p:txBody>
+          <a:bodyPr/>
+          <a:lstStyle/>
+          <a:p>
+            <a:fld id="{D8012ECC-3B28-B646-84D5-C4078AE4DBC5}" type="slidenum">
+              <a:rPr lang="en-US" smtClean="0"/>
+              <a:t>2</a:t>
+            </a:fld>
+            <a:endParaRPr lang="en-US"/>
+          </a:p>
+        </p:txBody>
+      </p:sp>
+    </p:spTree>
+    <p:extLst>
+      <p:ext uri="{BB962C8B-B14F-4D97-AF65-F5344CB8AC3E}">
+        <p14:creationId xmlns:p14="http://schemas.microsoft.com/office/powerpoint/2010/main" val="4019574762"/>
+      </p:ext>
+    </p:extLst>
+  </p:cSld>
+  <p:clrMapOvr>
+    <a:masterClrMapping/>
+  </p:clrMapOvr>
+</p:notes>
+</file>
+
+<file path=ppt/notesSlides/notesSlide2.xml><?xml version="1.0" encoding="utf-8"?>
+<p:notes xmlns:a="http://schemas.openxmlformats.org/drawingml/2006/main" xmlns:r="http://schemas.openxmlformats.org/officeDocument/2006/relationships" xmlns:p="http://schemas.openxmlformats.org/presentationml/2006/main">
+  <p:cSld>
+    <p:spTree>
+      <p:nvGrpSpPr>
+        <p:cNvPr id="1" name=""/>
+        <p:cNvGrpSpPr/>
+        <p:nvPr/>
+      </p:nvGrpSpPr>
+      <p:grpSpPr>
+        <a:xfrm>
+          <a:off x="0" y="0"/>
+          <a:ext cx="0" cy="0"/>
+          <a:chOff x="0" y="0"/>
+          <a:chExt cx="0" cy="0"/>
+        </a:xfrm>
+      </p:grpSpPr>
+      <p:sp>
+        <p:nvSpPr>
+          <p:cNvPr id="2" name="Slide Image Placeholder 1"/>
+          <p:cNvSpPr>
+            <a:spLocks noGrp="1" noRot="1" noChangeAspect="1"/>
+          </p:cNvSpPr>
+          <p:nvPr>
+            <p:ph type="sldImg"/>
+          </p:nvPr>
+        </p:nvSpPr>
+        <p:spPr/>
+      </p:sp>
+      <p:sp>
+        <p:nvSpPr>
+          <p:cNvPr id="3" name="Notes Placeholder 2"/>
+          <p:cNvSpPr>
+            <a:spLocks noGrp="1"/>
+          </p:cNvSpPr>
+          <p:nvPr>
+            <p:ph type="body" idx="1"/>
+          </p:nvPr>
+        </p:nvSpPr>
+        <p:spPr/>
+        <p:txBody>
+          <a:bodyPr/>
+          <a:lstStyle/>
+          <a:p>
+            <a:endParaRPr lang="en-US" dirty="0"/>
+          </a:p>
+        </p:txBody>
+      </p:sp>
+      <p:sp>
+        <p:nvSpPr>
+          <p:cNvPr id="4" name="Slide Number Placeholder 3"/>
+          <p:cNvSpPr>
+            <a:spLocks noGrp="1"/>
+          </p:cNvSpPr>
+          <p:nvPr>
+            <p:ph type="sldNum" sz="quarter" idx="5"/>
+          </p:nvPr>
+        </p:nvSpPr>
+        <p:spPr/>
+        <p:txBody>
+          <a:bodyPr/>
+          <a:lstStyle/>
+          <a:p>
+            <a:fld id="{D8012ECC-3B28-B646-84D5-C4078AE4DBC5}" type="slidenum">
+              <a:rPr lang="en-US" smtClean="0"/>
+              <a:t>10</a:t>
+            </a:fld>
+            <a:endParaRPr lang="en-US"/>
+          </a:p>
+        </p:txBody>
+      </p:sp>
+    </p:spTree>
+    <p:extLst>
+      <p:ext uri="{BB962C8B-B14F-4D97-AF65-F5344CB8AC3E}">
+        <p14:creationId xmlns:p14="http://schemas.microsoft.com/office/powerpoint/2010/main" val="1934339174"/>
+      </p:ext>
+    </p:extLst>
+  </p:cSld>
+  <p:clrMapOvr>
+    <a:masterClrMapping/>
+  </p:clrMapOvr>
+</p:notes>
+</file>
+
 <file path=ppt/slideLayouts/slideLayout1.xml><?xml version="1.0" encoding="utf-8"?>
 <p:sldLayout xmlns:a="http://schemas.openxmlformats.org/drawingml/2006/main" xmlns:r="http://schemas.openxmlformats.org/officeDocument/2006/relationships" xmlns:p="http://schemas.openxmlformats.org/presentationml/2006/main" type="title" preserve="1">
   <p:cSld name="Title Slide">
@@ -259,9 +788,9 @@
           <a:bodyPr/>
           <a:lstStyle/>
           <a:p>
-            <a:fld id="{BDC8E90F-BA1E-3142-B41C-08A4D184F13C}" type="datetimeFigureOut">
+            <a:fld id="{6E340711-0012-B943-8AA8-2B4B22CD282D}" type="datetime1">
               <a:rPr lang="en-US" smtClean="0"/>
-              <a:t>1/21/21</a:t>
+              <a:t>3/6/21</a:t>
             </a:fld>
             <a:endParaRPr lang="en-US"/>
           </a:p>
@@ -457,9 +986,9 @@
           <a:bodyPr/>
           <a:lstStyle/>
           <a:p>
-            <a:fld id="{BDC8E90F-BA1E-3142-B41C-08A4D184F13C}" type="datetimeFigureOut">
+            <a:fld id="{40DD5BF0-55EF-CF48-A51A-0E10A5E9C4FB}" type="datetime1">
               <a:rPr lang="en-US" smtClean="0"/>
-              <a:t>1/21/21</a:t>
+              <a:t>3/6/21</a:t>
             </a:fld>
             <a:endParaRPr lang="en-US"/>
           </a:p>
@@ -665,9 +1194,9 @@
           <a:bodyPr/>
           <a:lstStyle/>
           <a:p>
-            <a:fld id="{BDC8E90F-BA1E-3142-B41C-08A4D184F13C}" type="datetimeFigureOut">
+            <a:fld id="{158A26FE-C312-AD49-83E1-1A56699B4C75}" type="datetime1">
               <a:rPr lang="en-US" smtClean="0"/>
-              <a:t>1/21/21</a:t>
+              <a:t>3/6/21</a:t>
             </a:fld>
             <a:endParaRPr lang="en-US"/>
           </a:p>
@@ -863,9 +1392,9 @@
           <a:bodyPr/>
           <a:lstStyle/>
           <a:p>
-            <a:fld id="{BDC8E90F-BA1E-3142-B41C-08A4D184F13C}" type="datetimeFigureOut">
+            <a:fld id="{19A615F8-3224-C54D-BA27-7BCE5EEED14A}" type="datetime1">
               <a:rPr lang="en-US" smtClean="0"/>
-              <a:t>1/21/21</a:t>
+              <a:t>3/6/21</a:t>
             </a:fld>
             <a:endParaRPr lang="en-US"/>
           </a:p>
@@ -1138,9 +1667,9 @@
           <a:bodyPr/>
           <a:lstStyle/>
           <a:p>
-            <a:fld id="{BDC8E90F-BA1E-3142-B41C-08A4D184F13C}" type="datetimeFigureOut">
+            <a:fld id="{A4F48A56-ADC2-304A-A686-BFB38470E229}" type="datetime1">
               <a:rPr lang="en-US" smtClean="0"/>
-              <a:t>1/21/21</a:t>
+              <a:t>3/6/21</a:t>
             </a:fld>
             <a:endParaRPr lang="en-US"/>
           </a:p>
@@ -1403,9 +1932,9 @@
           <a:bodyPr/>
           <a:lstStyle/>
           <a:p>
-            <a:fld id="{BDC8E90F-BA1E-3142-B41C-08A4D184F13C}" type="datetimeFigureOut">
+            <a:fld id="{E4F6836E-3EF4-2D48-A5B3-4522848E7CF7}" type="datetime1">
               <a:rPr lang="en-US" smtClean="0"/>
-              <a:t>1/21/21</a:t>
+              <a:t>3/6/21</a:t>
             </a:fld>
             <a:endParaRPr lang="en-US"/>
           </a:p>
@@ -1815,9 +2344,9 @@
           <a:bodyPr/>
           <a:lstStyle/>
           <a:p>
-            <a:fld id="{BDC8E90F-BA1E-3142-B41C-08A4D184F13C}" type="datetimeFigureOut">
+            <a:fld id="{E75C92BF-2187-1E4D-A0B9-FC492E92B411}" type="datetime1">
               <a:rPr lang="en-US" smtClean="0"/>
-              <a:t>1/21/21</a:t>
+              <a:t>3/6/21</a:t>
             </a:fld>
             <a:endParaRPr lang="en-US"/>
           </a:p>
@@ -1956,9 +2485,9 @@
           <a:bodyPr/>
           <a:lstStyle/>
           <a:p>
-            <a:fld id="{BDC8E90F-BA1E-3142-B41C-08A4D184F13C}" type="datetimeFigureOut">
+            <a:fld id="{92B39508-B16C-F941-B337-5FE3C9220546}" type="datetime1">
               <a:rPr lang="en-US" smtClean="0"/>
-              <a:t>1/21/21</a:t>
+              <a:t>3/6/21</a:t>
             </a:fld>
             <a:endParaRPr lang="en-US"/>
           </a:p>
@@ -2069,9 +2598,9 @@
           <a:bodyPr/>
           <a:lstStyle/>
           <a:p>
-            <a:fld id="{BDC8E90F-BA1E-3142-B41C-08A4D184F13C}" type="datetimeFigureOut">
+            <a:fld id="{3CD32A7D-D121-BF4F-8397-9ED880F24538}" type="datetime1">
               <a:rPr lang="en-US" smtClean="0"/>
-              <a:t>1/21/21</a:t>
+              <a:t>3/6/21</a:t>
             </a:fld>
             <a:endParaRPr lang="en-US"/>
           </a:p>
@@ -2380,9 +2909,9 @@
           <a:bodyPr/>
           <a:lstStyle/>
           <a:p>
-            <a:fld id="{BDC8E90F-BA1E-3142-B41C-08A4D184F13C}" type="datetimeFigureOut">
+            <a:fld id="{5493B5AC-E223-6C4C-BF9D-A90772A912E9}" type="datetime1">
               <a:rPr lang="en-US" smtClean="0"/>
-              <a:t>1/21/21</a:t>
+              <a:t>3/6/21</a:t>
             </a:fld>
             <a:endParaRPr lang="en-US"/>
           </a:p>
@@ -2668,9 +3197,9 @@
           <a:bodyPr/>
           <a:lstStyle/>
           <a:p>
-            <a:fld id="{BDC8E90F-BA1E-3142-B41C-08A4D184F13C}" type="datetimeFigureOut">
+            <a:fld id="{E96FAC7D-AC5B-974E-84FE-2647076D7590}" type="datetime1">
               <a:rPr lang="en-US" smtClean="0"/>
-              <a:t>1/21/21</a:t>
+              <a:t>3/6/21</a:t>
             </a:fld>
             <a:endParaRPr lang="en-US"/>
           </a:p>
@@ -2909,9 +3438,9 @@
             </a:lvl1pPr>
           </a:lstStyle>
           <a:p>
-            <a:fld id="{BDC8E90F-BA1E-3142-B41C-08A4D184F13C}" type="datetimeFigureOut">
+            <a:fld id="{891FB6C2-03DB-584E-8955-6C836EF0F673}" type="datetime1">
               <a:rPr lang="en-US" smtClean="0"/>
-              <a:t>1/21/21</a:t>
+              <a:t>3/6/21</a:t>
             </a:fld>
             <a:endParaRPr lang="en-US"/>
           </a:p>
@@ -3028,6 +3557,7 @@
     <p:sldLayoutId id="2147483658" r:id="rId10"/>
     <p:sldLayoutId id="2147483659" r:id="rId11"/>
   </p:sldLayoutIdLst>
+  <p:hf sldNum="0" hdr="0" ftr="0" dt="0"/>
   <p:txStyles>
     <p:titleStyle>
       <a:lvl1pPr algn="l" defTabSz="914400" rtl="0" eaLnBrk="1" latinLnBrk="0" hangingPunct="1">
@@ -3346,35 +3876,46 @@
         </p:nvSpPr>
         <p:spPr/>
         <p:txBody>
+          <a:bodyPr>
+            <a:normAutofit/>
+          </a:bodyPr>
+          <a:lstStyle/>
+          <a:p>
+            <a:r>
+              <a:rPr lang="en-US" sz="4800" dirty="0"/>
+              <a:t>Contaminant source identification with neural network surrogates</a:t>
+            </a:r>
+          </a:p>
+        </p:txBody>
+      </p:sp>
+      <p:sp>
+        <p:nvSpPr>
+          <p:cNvPr id="3" name="Subtitle 2">
+            <a:extLst>
+              <a:ext uri="{FF2B5EF4-FFF2-40B4-BE49-F238E27FC236}">
+                <a16:creationId xmlns:a16="http://schemas.microsoft.com/office/drawing/2014/main" id="{01A78469-8D0A-FB41-9B5B-43D958932868}"/>
+              </a:ext>
+            </a:extLst>
+          </p:cNvPr>
+          <p:cNvSpPr>
+            <a:spLocks noGrp="1"/>
+          </p:cNvSpPr>
+          <p:nvPr>
+            <p:ph type="subTitle" idx="1"/>
+          </p:nvPr>
+        </p:nvSpPr>
+        <p:spPr/>
+        <p:txBody>
           <a:bodyPr/>
           <a:lstStyle/>
           <a:p>
-            <a:endParaRPr lang="en-US"/>
-          </a:p>
-        </p:txBody>
-      </p:sp>
-      <p:sp>
-        <p:nvSpPr>
-          <p:cNvPr id="3" name="Subtitle 2">
-            <a:extLst>
-              <a:ext uri="{FF2B5EF4-FFF2-40B4-BE49-F238E27FC236}">
-                <a16:creationId xmlns:a16="http://schemas.microsoft.com/office/drawing/2014/main" id="{01A78469-8D0A-FB41-9B5B-43D958932868}"/>
-              </a:ext>
-            </a:extLst>
-          </p:cNvPr>
-          <p:cNvSpPr>
-            <a:spLocks noGrp="1"/>
-          </p:cNvSpPr>
-          <p:nvPr>
-            <p:ph type="subTitle" idx="1"/>
-          </p:nvPr>
-        </p:nvSpPr>
-        <p:spPr/>
-        <p:txBody>
-          <a:bodyPr/>
-          <a:lstStyle/>
-          <a:p>
-            <a:endParaRPr lang="en-US"/>
+            <a:r>
+              <a:rPr lang="en-US" dirty="0"/>
+              <a:t>Zitong Zhou, 03/05/21</a:t>
+            </a:r>
+          </a:p>
+          <a:p>
+            <a:endParaRPr lang="en-US" dirty="0"/>
           </a:p>
         </p:txBody>
       </p:sp>
@@ -3382,6 +3923,530 @@
     <p:extLst>
       <p:ext uri="{BB962C8B-B14F-4D97-AF65-F5344CB8AC3E}">
         <p14:creationId xmlns:p14="http://schemas.microsoft.com/office/powerpoint/2010/main" val="946494817"/>
+      </p:ext>
+    </p:extLst>
+  </p:cSld>
+  <p:clrMapOvr>
+    <a:masterClrMapping/>
+  </p:clrMapOvr>
+</p:sld>
+</file>
+
+<file path=ppt/slides/slide10.xml><?xml version="1.0" encoding="utf-8"?>
+<p:sld xmlns:a="http://schemas.openxmlformats.org/drawingml/2006/main" xmlns:r="http://schemas.openxmlformats.org/officeDocument/2006/relationships" xmlns:p="http://schemas.openxmlformats.org/presentationml/2006/main">
+  <p:cSld>
+    <p:spTree>
+      <p:nvGrpSpPr>
+        <p:cNvPr id="1" name=""/>
+        <p:cNvGrpSpPr/>
+        <p:nvPr/>
+      </p:nvGrpSpPr>
+      <p:grpSpPr>
+        <a:xfrm>
+          <a:off x="0" y="0"/>
+          <a:ext cx="0" cy="0"/>
+          <a:chOff x="0" y="0"/>
+          <a:chExt cx="0" cy="0"/>
+        </a:xfrm>
+      </p:grpSpPr>
+      <p:sp>
+        <p:nvSpPr>
+          <p:cNvPr id="2" name="Title 1">
+            <a:extLst>
+              <a:ext uri="{FF2B5EF4-FFF2-40B4-BE49-F238E27FC236}">
+                <a16:creationId xmlns:a16="http://schemas.microsoft.com/office/drawing/2014/main" id="{5C912F08-AC8D-F547-9730-551D6977A918}"/>
+              </a:ext>
+            </a:extLst>
+          </p:cNvPr>
+          <p:cNvSpPr>
+            <a:spLocks noGrp="1"/>
+          </p:cNvSpPr>
+          <p:nvPr>
+            <p:ph type="title"/>
+          </p:nvPr>
+        </p:nvSpPr>
+        <p:spPr/>
+        <p:txBody>
+          <a:bodyPr/>
+          <a:lstStyle/>
+          <a:p>
+            <a:r>
+              <a:rPr lang="en-US" dirty="0"/>
+              <a:t>Putting things together</a:t>
+            </a:r>
+          </a:p>
+        </p:txBody>
+      </p:sp>
+      <p:sp>
+        <p:nvSpPr>
+          <p:cNvPr id="3" name="Content Placeholder 2">
+            <a:extLst>
+              <a:ext uri="{FF2B5EF4-FFF2-40B4-BE49-F238E27FC236}">
+                <a16:creationId xmlns:a16="http://schemas.microsoft.com/office/drawing/2014/main" id="{E4739A91-BDCB-A948-B56B-C76038752A76}"/>
+              </a:ext>
+            </a:extLst>
+          </p:cNvPr>
+          <p:cNvSpPr>
+            <a:spLocks noGrp="1"/>
+          </p:cNvSpPr>
+          <p:nvPr>
+            <p:ph idx="1"/>
+          </p:nvPr>
+        </p:nvSpPr>
+        <p:spPr/>
+        <p:txBody>
+          <a:bodyPr/>
+          <a:lstStyle/>
+          <a:p>
+            <a:r>
+              <a:rPr lang="en-US" dirty="0"/>
+              <a:t>Represent hydraulic conductivity field with low dimensional latent variable z, from standard normal distribution.</a:t>
+            </a:r>
+          </a:p>
+          <a:p>
+            <a:r>
+              <a:rPr lang="en-US" dirty="0"/>
+              <a:t>Build Bayesian forward surrogate model, ~20 neural networks as an ensemble.</a:t>
+            </a:r>
+          </a:p>
+          <a:p>
+            <a:r>
+              <a:rPr lang="en-US" dirty="0"/>
+              <a:t>Inverse process: sample from the posterior distribution</a:t>
+            </a:r>
+          </a:p>
+          <a:p>
+            <a:endParaRPr lang="en-US" dirty="0"/>
+          </a:p>
+        </p:txBody>
+      </p:sp>
+      <p:pic>
+        <p:nvPicPr>
+          <p:cNvPr id="4" name="Picture 3">
+            <a:extLst>
+              <a:ext uri="{FF2B5EF4-FFF2-40B4-BE49-F238E27FC236}">
+                <a16:creationId xmlns:a16="http://schemas.microsoft.com/office/drawing/2014/main" id="{1E48D605-6B67-A54A-B154-3E6B57096F12}"/>
+              </a:ext>
+            </a:extLst>
+          </p:cNvPr>
+          <p:cNvPicPr>
+            <a:picLocks noChangeAspect="1"/>
+          </p:cNvPicPr>
+          <p:nvPr/>
+        </p:nvPicPr>
+        <p:blipFill>
+          <a:blip r:embed="rId3"/>
+          <a:stretch>
+            <a:fillRect/>
+          </a:stretch>
+        </p:blipFill>
+        <p:spPr>
+          <a:xfrm>
+            <a:off x="2261870" y="4243070"/>
+            <a:ext cx="7302500" cy="241300"/>
+          </a:xfrm>
+          <a:prstGeom prst="rect">
+            <a:avLst/>
+          </a:prstGeom>
+        </p:spPr>
+      </p:pic>
+    </p:spTree>
+    <p:extLst>
+      <p:ext uri="{BB962C8B-B14F-4D97-AF65-F5344CB8AC3E}">
+        <p14:creationId xmlns:p14="http://schemas.microsoft.com/office/powerpoint/2010/main" val="3573456479"/>
+      </p:ext>
+    </p:extLst>
+  </p:cSld>
+  <p:clrMapOvr>
+    <a:masterClrMapping/>
+  </p:clrMapOvr>
+</p:sld>
+</file>
+
+<file path=ppt/slides/slide11.xml><?xml version="1.0" encoding="utf-8"?>
+<p:sld xmlns:a="http://schemas.openxmlformats.org/drawingml/2006/main" xmlns:r="http://schemas.openxmlformats.org/officeDocument/2006/relationships" xmlns:p="http://schemas.openxmlformats.org/presentationml/2006/main">
+  <p:cSld>
+    <p:spTree>
+      <p:nvGrpSpPr>
+        <p:cNvPr id="1" name=""/>
+        <p:cNvGrpSpPr/>
+        <p:nvPr/>
+      </p:nvGrpSpPr>
+      <p:grpSpPr>
+        <a:xfrm>
+          <a:off x="0" y="0"/>
+          <a:ext cx="0" cy="0"/>
+          <a:chOff x="0" y="0"/>
+          <a:chExt cx="0" cy="0"/>
+        </a:xfrm>
+      </p:grpSpPr>
+      <p:sp>
+        <p:nvSpPr>
+          <p:cNvPr id="2" name="Title 1">
+            <a:extLst>
+              <a:ext uri="{FF2B5EF4-FFF2-40B4-BE49-F238E27FC236}">
+                <a16:creationId xmlns:a16="http://schemas.microsoft.com/office/drawing/2014/main" id="{62D23A3C-B718-1D42-80FA-AE3C58D9C009}"/>
+              </a:ext>
+            </a:extLst>
+          </p:cNvPr>
+          <p:cNvSpPr>
+            <a:spLocks noGrp="1"/>
+          </p:cNvSpPr>
+          <p:nvPr>
+            <p:ph type="title"/>
+          </p:nvPr>
+        </p:nvSpPr>
+        <p:spPr/>
+        <p:txBody>
+          <a:bodyPr/>
+          <a:lstStyle/>
+          <a:p>
+            <a:r>
+              <a:rPr lang="en-US" dirty="0"/>
+              <a:t>Numerical experiments(NN part)</a:t>
+            </a:r>
+          </a:p>
+        </p:txBody>
+      </p:sp>
+      <p:sp>
+        <p:nvSpPr>
+          <p:cNvPr id="3" name="Content Placeholder 2">
+            <a:extLst>
+              <a:ext uri="{FF2B5EF4-FFF2-40B4-BE49-F238E27FC236}">
+                <a16:creationId xmlns:a16="http://schemas.microsoft.com/office/drawing/2014/main" id="{117B220E-9BD0-4A4C-A72C-CD5B476D9D51}"/>
+              </a:ext>
+            </a:extLst>
+          </p:cNvPr>
+          <p:cNvSpPr>
+            <a:spLocks noGrp="1"/>
+          </p:cNvSpPr>
+          <p:nvPr>
+            <p:ph idx="1"/>
+          </p:nvPr>
+        </p:nvSpPr>
+        <p:spPr>
+          <a:xfrm>
+            <a:off x="838200" y="1784985"/>
+            <a:ext cx="10515600" cy="4351338"/>
+          </a:xfrm>
+        </p:spPr>
+        <p:txBody>
+          <a:bodyPr/>
+          <a:lstStyle/>
+          <a:p>
+            <a:r>
+              <a:rPr lang="en-US" dirty="0"/>
+              <a:t>Surrogate forward model Dataset:</a:t>
+            </a:r>
+          </a:p>
+          <a:p>
+            <a:pPr lvl="1"/>
+            <a:r>
+              <a:rPr lang="en-US" dirty="0"/>
+              <a:t>Conductivity fields from a big image</a:t>
+            </a:r>
+          </a:p>
+          <a:p>
+            <a:pPr lvl="1"/>
+            <a:r>
+              <a:rPr lang="en-US" dirty="0"/>
+              <a:t>Source, through well injection in the first 20 years</a:t>
+            </a:r>
+          </a:p>
+          <a:p>
+            <a:pPr lvl="1"/>
+            <a:r>
+              <a:rPr lang="en-US" dirty="0"/>
+              <a:t>Hydraulic head fixed on x=0, L</a:t>
+            </a:r>
+          </a:p>
+          <a:p>
+            <a:pPr lvl="1"/>
+            <a:r>
+              <a:rPr lang="en-US" dirty="0"/>
+              <a:t>Simulation time, 40 years in total</a:t>
+            </a:r>
+          </a:p>
+          <a:p>
+            <a:pPr lvl="1"/>
+            <a:r>
+              <a:rPr lang="en-US" dirty="0"/>
+              <a:t>Injection happened in 1 of the 20 wells</a:t>
+            </a:r>
+          </a:p>
+        </p:txBody>
+      </p:sp>
+      <p:pic>
+        <p:nvPicPr>
+          <p:cNvPr id="4" name="Picture 3" descr="Chart, waterfall chart&#10;&#10;Description automatically generated">
+            <a:extLst>
+              <a:ext uri="{FF2B5EF4-FFF2-40B4-BE49-F238E27FC236}">
+                <a16:creationId xmlns:a16="http://schemas.microsoft.com/office/drawing/2014/main" id="{1C8ACE0B-302C-7248-BB0C-9E2DDF396225}"/>
+              </a:ext>
+            </a:extLst>
+          </p:cNvPr>
+          <p:cNvPicPr>
+            <a:picLocks noChangeAspect="1"/>
+          </p:cNvPicPr>
+          <p:nvPr/>
+        </p:nvPicPr>
+        <p:blipFill>
+          <a:blip r:embed="rId2"/>
+          <a:stretch>
+            <a:fillRect/>
+          </a:stretch>
+        </p:blipFill>
+        <p:spPr>
+          <a:xfrm>
+            <a:off x="0" y="4157673"/>
+            <a:ext cx="11988800" cy="2628900"/>
+          </a:xfrm>
+          <a:prstGeom prst="rect">
+            <a:avLst/>
+          </a:prstGeom>
+        </p:spPr>
+      </p:pic>
+    </p:spTree>
+    <p:extLst>
+      <p:ext uri="{BB962C8B-B14F-4D97-AF65-F5344CB8AC3E}">
+        <p14:creationId xmlns:p14="http://schemas.microsoft.com/office/powerpoint/2010/main" val="2915406950"/>
+      </p:ext>
+    </p:extLst>
+  </p:cSld>
+  <p:clrMapOvr>
+    <a:masterClrMapping/>
+  </p:clrMapOvr>
+</p:sld>
+</file>
+
+<file path=ppt/slides/slide12.xml><?xml version="1.0" encoding="utf-8"?>
+<p:sld xmlns:a="http://schemas.openxmlformats.org/drawingml/2006/main" xmlns:r="http://schemas.openxmlformats.org/officeDocument/2006/relationships" xmlns:p="http://schemas.openxmlformats.org/presentationml/2006/main">
+  <p:cSld>
+    <p:spTree>
+      <p:nvGrpSpPr>
+        <p:cNvPr id="1" name=""/>
+        <p:cNvGrpSpPr/>
+        <p:nvPr/>
+      </p:nvGrpSpPr>
+      <p:grpSpPr>
+        <a:xfrm>
+          <a:off x="0" y="0"/>
+          <a:ext cx="0" cy="0"/>
+          <a:chOff x="0" y="0"/>
+          <a:chExt cx="0" cy="0"/>
+        </a:xfrm>
+      </p:grpSpPr>
+      <p:sp>
+        <p:nvSpPr>
+          <p:cNvPr id="2" name="Title 1">
+            <a:extLst>
+              <a:ext uri="{FF2B5EF4-FFF2-40B4-BE49-F238E27FC236}">
+                <a16:creationId xmlns:a16="http://schemas.microsoft.com/office/drawing/2014/main" id="{7FD88F38-EA38-6141-9FBF-E90A84CF588E}"/>
+              </a:ext>
+            </a:extLst>
+          </p:cNvPr>
+          <p:cNvSpPr>
+            <a:spLocks noGrp="1"/>
+          </p:cNvSpPr>
+          <p:nvPr>
+            <p:ph type="title"/>
+          </p:nvPr>
+        </p:nvSpPr>
+        <p:spPr/>
+        <p:txBody>
+          <a:bodyPr/>
+          <a:lstStyle/>
+          <a:p>
+            <a:r>
+              <a:rPr lang="en-US"/>
+              <a:t>Numerical experiments(NN part)</a:t>
+            </a:r>
+            <a:endParaRPr lang="en-US" dirty="0"/>
+          </a:p>
+        </p:txBody>
+      </p:sp>
+      <p:sp>
+        <p:nvSpPr>
+          <p:cNvPr id="3" name="Content Placeholder 2">
+            <a:extLst>
+              <a:ext uri="{FF2B5EF4-FFF2-40B4-BE49-F238E27FC236}">
+                <a16:creationId xmlns:a16="http://schemas.microsoft.com/office/drawing/2014/main" id="{40466D29-F41F-4146-AD55-884DCF3D6BE6}"/>
+              </a:ext>
+            </a:extLst>
+          </p:cNvPr>
+          <p:cNvSpPr>
+            <a:spLocks noGrp="1"/>
+          </p:cNvSpPr>
+          <p:nvPr>
+            <p:ph idx="1"/>
+          </p:nvPr>
+        </p:nvSpPr>
+        <p:spPr>
+          <a:xfrm>
+            <a:off x="838200" y="1825625"/>
+            <a:ext cx="5105400" cy="1984375"/>
+          </a:xfrm>
+        </p:spPr>
+        <p:txBody>
+          <a:bodyPr>
+            <a:normAutofit/>
+          </a:bodyPr>
+          <a:lstStyle/>
+          <a:p>
+            <a:r>
+              <a:rPr lang="en-US" dirty="0"/>
+              <a:t>CAAE for the </a:t>
+            </a:r>
+            <a:r>
+              <a:rPr lang="en-US" dirty="0" err="1"/>
+              <a:t>hk</a:t>
+            </a:r>
+            <a:r>
+              <a:rPr lang="en-US" dirty="0"/>
+              <a:t> field:</a:t>
+            </a:r>
+          </a:p>
+        </p:txBody>
+      </p:sp>
+      <p:pic>
+        <p:nvPicPr>
+          <p:cNvPr id="5" name="Picture 4" descr="A picture containing text, colorful&#10;&#10;Description automatically generated">
+            <a:extLst>
+              <a:ext uri="{FF2B5EF4-FFF2-40B4-BE49-F238E27FC236}">
+                <a16:creationId xmlns:a16="http://schemas.microsoft.com/office/drawing/2014/main" id="{E0423953-8E85-FE40-BE5A-91788C3F3E3C}"/>
+              </a:ext>
+            </a:extLst>
+          </p:cNvPr>
+          <p:cNvPicPr>
+            <a:picLocks noChangeAspect="1"/>
+          </p:cNvPicPr>
+          <p:nvPr/>
+        </p:nvPicPr>
+        <p:blipFill>
+          <a:blip r:embed="rId2"/>
+          <a:stretch>
+            <a:fillRect/>
+          </a:stretch>
+        </p:blipFill>
+        <p:spPr>
+          <a:xfrm>
+            <a:off x="1149350" y="2528804"/>
+            <a:ext cx="4306570" cy="2944979"/>
+          </a:xfrm>
+          <a:prstGeom prst="rect">
+            <a:avLst/>
+          </a:prstGeom>
+        </p:spPr>
+      </p:pic>
+      <p:sp>
+        <p:nvSpPr>
+          <p:cNvPr id="8" name="TextBox 7">
+            <a:extLst>
+              <a:ext uri="{FF2B5EF4-FFF2-40B4-BE49-F238E27FC236}">
+                <a16:creationId xmlns:a16="http://schemas.microsoft.com/office/drawing/2014/main" id="{458D0FEA-E751-8646-990F-8D6270DE4523}"/>
+              </a:ext>
+            </a:extLst>
+          </p:cNvPr>
+          <p:cNvSpPr txBox="1"/>
+          <p:nvPr/>
+        </p:nvSpPr>
+        <p:spPr>
+          <a:xfrm>
+            <a:off x="6471920" y="1812290"/>
+            <a:ext cx="4460901" cy="523220"/>
+          </a:xfrm>
+          <a:prstGeom prst="rect">
+            <a:avLst/>
+          </a:prstGeom>
+          <a:noFill/>
+        </p:spPr>
+        <p:txBody>
+          <a:bodyPr wrap="none" rtlCol="0">
+            <a:spAutoFit/>
+          </a:bodyPr>
+          <a:lstStyle/>
+          <a:p>
+            <a:pPr marL="285750" indent="-285750">
+              <a:buFont typeface="Arial" panose="020B0604020202020204" pitchFamily="34" charset="0"/>
+              <a:buChar char="•"/>
+            </a:pPr>
+            <a:r>
+              <a:rPr lang="en-US" sz="2800" dirty="0"/>
+              <a:t>1 forward surrogate model:</a:t>
+            </a:r>
+          </a:p>
+        </p:txBody>
+      </p:sp>
+      <p:pic>
+        <p:nvPicPr>
+          <p:cNvPr id="15" name="Picture 14">
+            <a:extLst>
+              <a:ext uri="{FF2B5EF4-FFF2-40B4-BE49-F238E27FC236}">
+                <a16:creationId xmlns:a16="http://schemas.microsoft.com/office/drawing/2014/main" id="{5AC8D9DD-DD06-4441-81B2-8AF15FDB5C69}"/>
+              </a:ext>
+            </a:extLst>
+          </p:cNvPr>
+          <p:cNvPicPr>
+            <a:picLocks noChangeAspect="1"/>
+          </p:cNvPicPr>
+          <p:nvPr/>
+        </p:nvPicPr>
+        <p:blipFill>
+          <a:blip r:embed="rId3"/>
+          <a:stretch>
+            <a:fillRect/>
+          </a:stretch>
+        </p:blipFill>
+        <p:spPr>
+          <a:xfrm>
+            <a:off x="5792754" y="2470447"/>
+            <a:ext cx="6399246" cy="3016671"/>
+          </a:xfrm>
+          <a:prstGeom prst="rect">
+            <a:avLst/>
+          </a:prstGeom>
+        </p:spPr>
+      </p:pic>
+      <p:cxnSp>
+        <p:nvCxnSpPr>
+          <p:cNvPr id="17" name="Straight Connector 16">
+            <a:extLst>
+              <a:ext uri="{FF2B5EF4-FFF2-40B4-BE49-F238E27FC236}">
+                <a16:creationId xmlns:a16="http://schemas.microsoft.com/office/drawing/2014/main" id="{6EBAB3EE-6576-194B-85F7-918380FFAB93}"/>
+              </a:ext>
+            </a:extLst>
+          </p:cNvPr>
+          <p:cNvCxnSpPr/>
+          <p:nvPr/>
+        </p:nvCxnSpPr>
+        <p:spPr>
+          <a:xfrm>
+            <a:off x="5598160" y="1524000"/>
+            <a:ext cx="0" cy="5110480"/>
+          </a:xfrm>
+          <a:prstGeom prst="line">
+            <a:avLst/>
+          </a:prstGeom>
+        </p:spPr>
+        <p:style>
+          <a:lnRef idx="1">
+            <a:schemeClr val="accent1"/>
+          </a:lnRef>
+          <a:fillRef idx="0">
+            <a:schemeClr val="accent1"/>
+          </a:fillRef>
+          <a:effectRef idx="0">
+            <a:schemeClr val="accent1"/>
+          </a:effectRef>
+          <a:fontRef idx="minor">
+            <a:schemeClr val="tx1"/>
+          </a:fontRef>
+        </p:style>
+      </p:cxnSp>
+    </p:spTree>
+    <p:extLst>
+      <p:ext uri="{BB962C8B-B14F-4D97-AF65-F5344CB8AC3E}">
+        <p14:creationId xmlns:p14="http://schemas.microsoft.com/office/powerpoint/2010/main" val="2704553966"/>
       </p:ext>
     </p:extLst>
   </p:cSld>
@@ -3408,126 +4473,140 @@
           <a:chExt cx="0" cy="0"/>
         </a:xfrm>
       </p:grpSpPr>
+      <p:sp>
+        <p:nvSpPr>
+          <p:cNvPr id="2" name="Title 1">
+            <a:extLst>
+              <a:ext uri="{FF2B5EF4-FFF2-40B4-BE49-F238E27FC236}">
+                <a16:creationId xmlns:a16="http://schemas.microsoft.com/office/drawing/2014/main" id="{E4D0DE1C-025C-9B40-9892-13FF45C118EF}"/>
+              </a:ext>
+            </a:extLst>
+          </p:cNvPr>
+          <p:cNvSpPr>
+            <a:spLocks noGrp="1"/>
+          </p:cNvSpPr>
+          <p:nvPr>
+            <p:ph type="title"/>
+          </p:nvPr>
+        </p:nvSpPr>
+        <p:spPr/>
+        <p:txBody>
+          <a:bodyPr/>
+          <a:lstStyle/>
+          <a:p>
+            <a:r>
+              <a:rPr lang="en-US" dirty="0"/>
+              <a:t>Problem Background</a:t>
+            </a:r>
+          </a:p>
+        </p:txBody>
+      </p:sp>
+      <p:sp>
+        <p:nvSpPr>
+          <p:cNvPr id="3" name="Content Placeholder 2">
+            <a:extLst>
+              <a:ext uri="{FF2B5EF4-FFF2-40B4-BE49-F238E27FC236}">
+                <a16:creationId xmlns:a16="http://schemas.microsoft.com/office/drawing/2014/main" id="{BC3C82DC-CF88-DE42-94F4-A396780B4E7D}"/>
+              </a:ext>
+            </a:extLst>
+          </p:cNvPr>
+          <p:cNvSpPr>
+            <a:spLocks noGrp="1"/>
+          </p:cNvSpPr>
+          <p:nvPr>
+            <p:ph idx="1"/>
+          </p:nvPr>
+        </p:nvSpPr>
+        <p:spPr>
+          <a:xfrm>
+            <a:off x="838200" y="1825625"/>
+            <a:ext cx="6219825" cy="4217988"/>
+          </a:xfrm>
+        </p:spPr>
+        <p:txBody>
+          <a:bodyPr>
+            <a:normAutofit lnSpcReduction="10000"/>
+          </a:bodyPr>
+          <a:lstStyle/>
+          <a:p>
+            <a:r>
+              <a:rPr lang="en-US" dirty="0"/>
+              <a:t>Organic contaminants such as Trichloropropane (TCP, used in industrial solvent production) enters drinking water[1].</a:t>
+            </a:r>
+          </a:p>
+          <a:p>
+            <a:r>
+              <a:rPr lang="en-US" dirty="0"/>
+              <a:t>TCP is on the list of cancer causes[2].</a:t>
+            </a:r>
+          </a:p>
+          <a:p>
+            <a:r>
+              <a:rPr lang="en-US" dirty="0"/>
+              <a:t>TCP is banned from use in soil fumigants now, but breakdown of it in the soil is slow.</a:t>
+            </a:r>
+          </a:p>
+          <a:p>
+            <a:r>
+              <a:rPr lang="en-US" dirty="0"/>
+              <a:t>Source identification is needed for further removal of TCP!</a:t>
+            </a:r>
+          </a:p>
+        </p:txBody>
+      </p:sp>
       <p:pic>
         <p:nvPicPr>
-          <p:cNvPr id="5" name="Picture 4" descr="Chart, diagram&#10;&#10;Description automatically generated">
-            <a:extLst>
-              <a:ext uri="{FF2B5EF4-FFF2-40B4-BE49-F238E27FC236}">
-                <a16:creationId xmlns:a16="http://schemas.microsoft.com/office/drawing/2014/main" id="{1B2DACDD-F1AA-2440-A75E-76C229DCAB27}"/>
+          <p:cNvPr id="1026" name="Picture 2" descr="Water systems where significant levels of contaminant 123-TCP have been detected.">
+            <a:extLst>
+              <a:ext uri="{FF2B5EF4-FFF2-40B4-BE49-F238E27FC236}">
+                <a16:creationId xmlns:a16="http://schemas.microsoft.com/office/drawing/2014/main" id="{CCA33184-1E56-8343-ACBF-247492382048}"/>
               </a:ext>
             </a:extLst>
           </p:cNvPr>
           <p:cNvPicPr>
-            <a:picLocks noChangeAspect="1"/>
+            <a:picLocks noChangeAspect="1" noChangeArrowheads="1"/>
           </p:cNvPicPr>
           <p:nvPr/>
         </p:nvPicPr>
         <p:blipFill>
-          <a:blip r:embed="rId2"/>
+          <a:blip r:embed="rId3">
+            <a:extLst>
+              <a:ext uri="{28A0092B-C50C-407E-A947-70E740481C1C}">
+                <a14:useLocalDpi xmlns:a14="http://schemas.microsoft.com/office/drawing/2010/main" val="0"/>
+              </a:ext>
+            </a:extLst>
+          </a:blip>
+          <a:srcRect/>
           <a:stretch>
             <a:fillRect/>
           </a:stretch>
         </p:blipFill>
-        <p:spPr>
-          <a:xfrm>
-            <a:off x="1388337" y="1597813"/>
-            <a:ext cx="3089071" cy="2057217"/>
-          </a:xfrm>
-          <a:prstGeom prst="rect">
-            <a:avLst/>
-          </a:prstGeom>
-        </p:spPr>
-      </p:pic>
-      <p:sp>
-        <p:nvSpPr>
-          <p:cNvPr id="6" name="TextBox 5">
-            <a:extLst>
-              <a:ext uri="{FF2B5EF4-FFF2-40B4-BE49-F238E27FC236}">
-                <a16:creationId xmlns:a16="http://schemas.microsoft.com/office/drawing/2014/main" id="{01489B4A-2A89-9744-9002-F138C9CC6726}"/>
-              </a:ext>
-            </a:extLst>
-          </p:cNvPr>
-          <p:cNvSpPr txBox="1"/>
-          <p:nvPr/>
-        </p:nvSpPr>
-        <p:spPr>
-          <a:xfrm>
-            <a:off x="2341789" y="3655030"/>
-            <a:ext cx="1641632" cy="646331"/>
+        <p:spPr bwMode="auto">
+          <a:xfrm>
+            <a:off x="7040005" y="547067"/>
+            <a:ext cx="4661183" cy="5193787"/>
           </a:xfrm>
           <a:prstGeom prst="rect">
             <a:avLst/>
           </a:prstGeom>
           <a:noFill/>
-        </p:spPr>
-        <p:txBody>
-          <a:bodyPr wrap="square" rtlCol="0">
-            <a:spAutoFit/>
-          </a:bodyPr>
-          <a:lstStyle/>
-          <a:p>
-            <a:r>
-              <a:rPr lang="en-US" dirty="0"/>
-              <a:t>Conductivity field: 6*32*64</a:t>
-            </a:r>
-          </a:p>
-        </p:txBody>
-      </p:sp>
-      <p:sp>
-        <p:nvSpPr>
-          <p:cNvPr id="7" name="Rounded Rectangle 6">
-            <a:extLst>
-              <a:ext uri="{FF2B5EF4-FFF2-40B4-BE49-F238E27FC236}">
-                <a16:creationId xmlns:a16="http://schemas.microsoft.com/office/drawing/2014/main" id="{681E39A5-31E2-E44E-86F0-F3108677B0E1}"/>
-              </a:ext>
-            </a:extLst>
-          </p:cNvPr>
-          <p:cNvSpPr/>
-          <p:nvPr/>
-        </p:nvSpPr>
-        <p:spPr>
-          <a:xfrm>
-            <a:off x="5977473" y="910470"/>
-            <a:ext cx="164757" cy="3459207"/>
-          </a:xfrm>
-          <a:prstGeom prst="roundRect">
-            <a:avLst/>
-          </a:prstGeom>
-          <a:solidFill>
-            <a:schemeClr val="accent1"/>
-          </a:solidFill>
-        </p:spPr>
-        <p:style>
-          <a:lnRef idx="2">
-            <a:schemeClr val="accent1">
-              <a:shade val="50000"/>
-            </a:schemeClr>
-          </a:lnRef>
-          <a:fillRef idx="1">
-            <a:schemeClr val="accent1"/>
-          </a:fillRef>
-          <a:effectRef idx="0">
-            <a:schemeClr val="accent1"/>
-          </a:effectRef>
-          <a:fontRef idx="minor">
-            <a:schemeClr val="lt1"/>
-          </a:fontRef>
-        </p:style>
-        <p:txBody>
-          <a:bodyPr rtlCol="0" anchor="ctr"/>
-          <a:lstStyle/>
-          <a:p>
-            <a:pPr algn="ctr"/>
-            <a:endParaRPr lang="en-US" dirty="0"/>
-          </a:p>
-        </p:txBody>
-      </p:sp>
-      <p:sp>
-        <p:nvSpPr>
-          <p:cNvPr id="8" name="TextBox 7">
-            <a:extLst>
-              <a:ext uri="{FF2B5EF4-FFF2-40B4-BE49-F238E27FC236}">
-                <a16:creationId xmlns:a16="http://schemas.microsoft.com/office/drawing/2014/main" id="{0D70B213-28BF-824D-8DA6-8170A7F080A4}"/>
+          <a:extLst>
+            <a:ext uri="{909E8E84-426E-40DD-AFC4-6F175D3DCCD1}">
+              <a14:hiddenFill xmlns:a14="http://schemas.microsoft.com/office/drawing/2010/main">
+                <a:solidFill>
+                  <a:srgbClr val="FFFFFF"/>
+                </a:solidFill>
+              </a14:hiddenFill>
+            </a:ext>
+          </a:extLst>
+        </p:spPr>
+      </p:pic>
+      <p:sp>
+        <p:nvSpPr>
+          <p:cNvPr id="4" name="TextBox 3">
+            <a:extLst>
+              <a:ext uri="{FF2B5EF4-FFF2-40B4-BE49-F238E27FC236}">
+                <a16:creationId xmlns:a16="http://schemas.microsoft.com/office/drawing/2014/main" id="{3A753688-B724-DF47-B0D4-08D6D9D28AC1}"/>
               </a:ext>
             </a:extLst>
           </p:cNvPr>
@@ -3536,8 +4615,8 @@
         </p:nvSpPr>
         <p:spPr>
           <a:xfrm>
-            <a:off x="5077306" y="4423101"/>
-            <a:ext cx="1965090" cy="369332"/>
+            <a:off x="490811" y="6178550"/>
+            <a:ext cx="6944530" cy="600164"/>
           </a:xfrm>
           <a:prstGeom prst="rect">
             <a:avLst/>
@@ -3550,273 +4629,68 @@
           </a:bodyPr>
           <a:lstStyle/>
           <a:p>
-            <a:pPr algn="ctr"/>
-            <a:r>
-              <a:rPr lang="en-US" dirty="0"/>
-              <a:t>Latent var </a:t>
-            </a:r>
-            <a:r>
-              <a:rPr lang="en-US" b="1" dirty="0"/>
-              <a:t>z</a:t>
-            </a:r>
-            <a:r>
-              <a:rPr lang="en-US" dirty="0"/>
-              <a:t>: 512*1</a:t>
-            </a:r>
-          </a:p>
-        </p:txBody>
-      </p:sp>
-      <p:pic>
-        <p:nvPicPr>
-          <p:cNvPr id="9" name="Picture 8" descr="Chart, diagram&#10;&#10;Description automatically generated">
-            <a:extLst>
-              <a:ext uri="{FF2B5EF4-FFF2-40B4-BE49-F238E27FC236}">
-                <a16:creationId xmlns:a16="http://schemas.microsoft.com/office/drawing/2014/main" id="{95607034-70BB-1542-8F32-3AF57ADB64AA}"/>
-              </a:ext>
-            </a:extLst>
-          </p:cNvPr>
-          <p:cNvPicPr>
-            <a:picLocks noChangeAspect="1"/>
-          </p:cNvPicPr>
-          <p:nvPr/>
-        </p:nvPicPr>
-        <p:blipFill>
-          <a:blip r:embed="rId2"/>
-          <a:stretch>
-            <a:fillRect/>
-          </a:stretch>
-        </p:blipFill>
-        <p:spPr>
-          <a:xfrm>
-            <a:off x="7393267" y="1624824"/>
-            <a:ext cx="3089071" cy="2057217"/>
-          </a:xfrm>
-          <a:prstGeom prst="rect">
-            <a:avLst/>
-          </a:prstGeom>
-        </p:spPr>
-      </p:pic>
-      <p:sp>
-        <p:nvSpPr>
-          <p:cNvPr id="10" name="TextBox 9">
-            <a:extLst>
-              <a:ext uri="{FF2B5EF4-FFF2-40B4-BE49-F238E27FC236}">
-                <a16:creationId xmlns:a16="http://schemas.microsoft.com/office/drawing/2014/main" id="{0AE721B4-BBD5-8444-8A02-E79C59ED4CF0}"/>
-              </a:ext>
-            </a:extLst>
-          </p:cNvPr>
-          <p:cNvSpPr txBox="1"/>
-          <p:nvPr/>
-        </p:nvSpPr>
-        <p:spPr>
-          <a:xfrm>
-            <a:off x="8503288" y="3655029"/>
-            <a:ext cx="1670726" cy="646331"/>
-          </a:xfrm>
-          <a:prstGeom prst="rect">
-            <a:avLst/>
-          </a:prstGeom>
-          <a:noFill/>
-        </p:spPr>
-        <p:txBody>
-          <a:bodyPr wrap="square" rtlCol="0">
-            <a:spAutoFit/>
-          </a:bodyPr>
-          <a:lstStyle/>
-          <a:p>
-            <a:r>
-              <a:rPr lang="en-US" dirty="0"/>
-              <a:t>Conductivity field: 6*32*64</a:t>
-            </a:r>
-          </a:p>
-        </p:txBody>
-      </p:sp>
-      <p:cxnSp>
-        <p:nvCxnSpPr>
-          <p:cNvPr id="12" name="Straight Arrow Connector 11">
-            <a:extLst>
-              <a:ext uri="{FF2B5EF4-FFF2-40B4-BE49-F238E27FC236}">
-                <a16:creationId xmlns:a16="http://schemas.microsoft.com/office/drawing/2014/main" id="{FB381EFF-012C-2742-87E8-177655A000F0}"/>
-              </a:ext>
-            </a:extLst>
-          </p:cNvPr>
-          <p:cNvCxnSpPr>
-            <a:stCxn id="5" idx="3"/>
-            <a:endCxn id="7" idx="1"/>
-          </p:cNvCxnSpPr>
-          <p:nvPr/>
-        </p:nvCxnSpPr>
-        <p:spPr>
-          <a:xfrm>
-            <a:off x="4477408" y="2626422"/>
-            <a:ext cx="1500065" cy="13652"/>
-          </a:xfrm>
-          <a:prstGeom prst="straightConnector1">
-            <a:avLst/>
-          </a:prstGeom>
-          <a:ln>
-            <a:tailEnd type="triangle"/>
-          </a:ln>
-        </p:spPr>
-        <p:style>
-          <a:lnRef idx="1">
-            <a:schemeClr val="accent1"/>
-          </a:lnRef>
-          <a:fillRef idx="0">
-            <a:schemeClr val="accent1"/>
-          </a:fillRef>
-          <a:effectRef idx="0">
-            <a:schemeClr val="accent1"/>
-          </a:effectRef>
-          <a:fontRef idx="minor">
-            <a:schemeClr val="tx1"/>
-          </a:fontRef>
-        </p:style>
-      </p:cxnSp>
-      <p:sp>
-        <p:nvSpPr>
-          <p:cNvPr id="13" name="TextBox 12">
-            <a:extLst>
-              <a:ext uri="{FF2B5EF4-FFF2-40B4-BE49-F238E27FC236}">
-                <a16:creationId xmlns:a16="http://schemas.microsoft.com/office/drawing/2014/main" id="{6F091EF9-4E50-EE41-8CB3-48DD0405579B}"/>
-              </a:ext>
-            </a:extLst>
-          </p:cNvPr>
-          <p:cNvSpPr txBox="1"/>
-          <p:nvPr/>
-        </p:nvSpPr>
-        <p:spPr>
-          <a:xfrm>
-            <a:off x="4775879" y="2337817"/>
-            <a:ext cx="956993" cy="369332"/>
-          </a:xfrm>
-          <a:prstGeom prst="rect">
-            <a:avLst/>
-          </a:prstGeom>
-          <a:noFill/>
-        </p:spPr>
-        <p:txBody>
-          <a:bodyPr wrap="none" rtlCol="0">
-            <a:spAutoFit/>
-          </a:bodyPr>
-          <a:lstStyle/>
-          <a:p>
-            <a:r>
-              <a:rPr lang="en-US" dirty="0"/>
-              <a:t>encoder</a:t>
-            </a:r>
-          </a:p>
-        </p:txBody>
-      </p:sp>
-      <p:cxnSp>
-        <p:nvCxnSpPr>
-          <p:cNvPr id="14" name="Straight Arrow Connector 13">
-            <a:extLst>
-              <a:ext uri="{FF2B5EF4-FFF2-40B4-BE49-F238E27FC236}">
-                <a16:creationId xmlns:a16="http://schemas.microsoft.com/office/drawing/2014/main" id="{FFB870AC-9076-9046-8137-64817AECD676}"/>
-              </a:ext>
-            </a:extLst>
-          </p:cNvPr>
-          <p:cNvCxnSpPr>
-            <a:cxnSpLocks/>
-            <a:stCxn id="7" idx="3"/>
-            <a:endCxn id="9" idx="1"/>
-          </p:cNvCxnSpPr>
-          <p:nvPr/>
-        </p:nvCxnSpPr>
-        <p:spPr>
-          <a:xfrm>
-            <a:off x="6142230" y="2640074"/>
-            <a:ext cx="1251037" cy="13359"/>
-          </a:xfrm>
-          <a:prstGeom prst="straightConnector1">
-            <a:avLst/>
-          </a:prstGeom>
-          <a:ln>
-            <a:tailEnd type="triangle"/>
-          </a:ln>
-        </p:spPr>
-        <p:style>
-          <a:lnRef idx="1">
-            <a:schemeClr val="accent1"/>
-          </a:lnRef>
-          <a:fillRef idx="0">
-            <a:schemeClr val="accent1"/>
-          </a:fillRef>
-          <a:effectRef idx="0">
-            <a:schemeClr val="accent1"/>
-          </a:effectRef>
-          <a:fontRef idx="minor">
-            <a:schemeClr val="tx1"/>
-          </a:fontRef>
-        </p:style>
-      </p:cxnSp>
-      <p:sp>
-        <p:nvSpPr>
-          <p:cNvPr id="15" name="TextBox 14">
-            <a:extLst>
-              <a:ext uri="{FF2B5EF4-FFF2-40B4-BE49-F238E27FC236}">
-                <a16:creationId xmlns:a16="http://schemas.microsoft.com/office/drawing/2014/main" id="{73A61B19-365F-6A4B-8CA1-A540BA2FE7D8}"/>
-              </a:ext>
-            </a:extLst>
-          </p:cNvPr>
-          <p:cNvSpPr txBox="1"/>
-          <p:nvPr/>
-        </p:nvSpPr>
-        <p:spPr>
-          <a:xfrm>
-            <a:off x="6271517" y="2337817"/>
-            <a:ext cx="956993" cy="369332"/>
-          </a:xfrm>
-          <a:prstGeom prst="rect">
-            <a:avLst/>
-          </a:prstGeom>
-          <a:noFill/>
-        </p:spPr>
-        <p:txBody>
-          <a:bodyPr wrap="square" rtlCol="0">
-            <a:spAutoFit/>
-          </a:bodyPr>
-          <a:lstStyle/>
-          <a:p>
-            <a:r>
-              <a:rPr lang="en-US" dirty="0"/>
-              <a:t>decoder</a:t>
-            </a:r>
-          </a:p>
-        </p:txBody>
-      </p:sp>
-      <p:sp>
-        <p:nvSpPr>
-          <p:cNvPr id="21" name="TextBox 20">
-            <a:extLst>
-              <a:ext uri="{FF2B5EF4-FFF2-40B4-BE49-F238E27FC236}">
-                <a16:creationId xmlns:a16="http://schemas.microsoft.com/office/drawing/2014/main" id="{E116FFB5-E92B-2348-BB00-8A61EA76BB65}"/>
-              </a:ext>
-            </a:extLst>
-          </p:cNvPr>
-          <p:cNvSpPr txBox="1"/>
-          <p:nvPr/>
-        </p:nvSpPr>
-        <p:spPr>
-          <a:xfrm>
-            <a:off x="708321" y="352024"/>
-            <a:ext cx="11188640" cy="461665"/>
-          </a:xfrm>
-          <a:prstGeom prst="rect">
-            <a:avLst/>
-          </a:prstGeom>
-          <a:noFill/>
-        </p:spPr>
-        <p:txBody>
-          <a:bodyPr wrap="none" rtlCol="0">
-            <a:spAutoFit/>
-          </a:bodyPr>
-          <a:lstStyle/>
-          <a:p>
-            <a:r>
-              <a:rPr lang="en-US" sz="2400" dirty="0"/>
-              <a:t>Parameterization of the conductivity field: Convolutional adversarial autoencoder(CAAE)</a:t>
+            <a:r>
+              <a:rPr lang="en-US" sz="1100" dirty="0"/>
+              <a:t>1: https://</a:t>
+            </a:r>
+            <a:r>
+              <a:rPr lang="en-US" sz="1100" dirty="0" err="1"/>
+              <a:t>www.cleanwateraction.org</a:t>
+            </a:r>
+            <a:r>
+              <a:rPr lang="en-US" sz="1100" dirty="0"/>
+              <a:t>/features/</a:t>
+            </a:r>
+            <a:r>
+              <a:rPr lang="en-US" sz="1100" dirty="0" err="1"/>
+              <a:t>tcp</a:t>
+            </a:r>
+            <a:r>
+              <a:rPr lang="en-US" sz="1100" dirty="0"/>
+              <a:t>-</a:t>
+            </a:r>
+            <a:r>
+              <a:rPr lang="en-US" sz="1100" dirty="0" err="1"/>
+              <a:t>californias</a:t>
+            </a:r>
+            <a:r>
+              <a:rPr lang="en-US" sz="1100" dirty="0"/>
+              <a:t>-drinking-water</a:t>
+            </a:r>
+          </a:p>
+          <a:p>
+            <a:r>
+              <a:rPr lang="en-US" sz="1100" dirty="0"/>
+              <a:t>2: </a:t>
+            </a:r>
+            <a:r>
+              <a:rPr lang="en-US" sz="1100" dirty="0">
+                <a:hlinkClick r:id="rId4"/>
+              </a:rPr>
+              <a:t>https://oehha.ca.gov/proposition-65/crnr/chemical-listed-effective-december-4-2015-known-state-california-cause</a:t>
+            </a:r>
+            <a:endParaRPr lang="en-US" sz="1100" dirty="0"/>
+          </a:p>
+          <a:p>
+            <a:r>
+              <a:rPr lang="en-US" sz="1100" dirty="0"/>
+              <a:t>3: SOURCE: CALIFORNIA STATE WATER RESOURCES CONTROL BOARD, MAP: </a:t>
+            </a:r>
+            <a:r>
+              <a:rPr lang="en-US" sz="1100" dirty="0" err="1"/>
+              <a:t>Teodros</a:t>
+            </a:r>
+            <a:r>
+              <a:rPr lang="en-US" sz="1100" dirty="0"/>
+              <a:t> </a:t>
+            </a:r>
+            <a:r>
+              <a:rPr lang="en-US" sz="1100" dirty="0" err="1"/>
+              <a:t>Hailye</a:t>
+            </a:r>
+            <a:r>
+              <a:rPr lang="en-US" sz="1100" dirty="0"/>
+              <a:t>, KQED Science</a:t>
             </a:r>
           </a:p>
         </p:txBody>
@@ -3824,7 +4698,7 @@
     </p:spTree>
     <p:extLst>
       <p:ext uri="{BB962C8B-B14F-4D97-AF65-F5344CB8AC3E}">
-        <p14:creationId xmlns:p14="http://schemas.microsoft.com/office/powerpoint/2010/main" val="2758145827"/>
+        <p14:creationId xmlns:p14="http://schemas.microsoft.com/office/powerpoint/2010/main" val="3046957963"/>
       </p:ext>
     </p:extLst>
   </p:cSld>
@@ -3856,7 +4730,7 @@
           <p:cNvPr id="2" name="Title 1">
             <a:extLst>
               <a:ext uri="{FF2B5EF4-FFF2-40B4-BE49-F238E27FC236}">
-                <a16:creationId xmlns:a16="http://schemas.microsoft.com/office/drawing/2014/main" id="{B4CE05A2-0D19-2546-B2E6-8539B844B424}"/>
+                <a16:creationId xmlns:a16="http://schemas.microsoft.com/office/drawing/2014/main" id="{52ECD88B-56E6-434D-AEC4-49DC55F3B87D}"/>
               </a:ext>
             </a:extLst>
           </p:cNvPr>
@@ -3874,45 +4748,180 @@
           <a:p>
             <a:r>
               <a:rPr lang="en-US" dirty="0"/>
-              <a:t>Bayesian Surrogate neural network </a:t>
+              <a:t>Forward Problem Formulation</a:t>
+            </a:r>
+          </a:p>
+        </p:txBody>
+      </p:sp>
+      <p:sp>
+        <p:nvSpPr>
+          <p:cNvPr id="3" name="TextBox 2">
+            <a:extLst>
+              <a:ext uri="{FF2B5EF4-FFF2-40B4-BE49-F238E27FC236}">
+                <a16:creationId xmlns:a16="http://schemas.microsoft.com/office/drawing/2014/main" id="{83458704-AF2E-7A49-ACAD-714FDD99F298}"/>
+              </a:ext>
+            </a:extLst>
+          </p:cNvPr>
+          <p:cNvSpPr txBox="1"/>
+          <p:nvPr/>
+        </p:nvSpPr>
+        <p:spPr>
+          <a:xfrm>
+            <a:off x="1073888" y="1558457"/>
+            <a:ext cx="7441140" cy="4801314"/>
+          </a:xfrm>
+          <a:prstGeom prst="rect">
+            <a:avLst/>
+          </a:prstGeom>
+          <a:noFill/>
+        </p:spPr>
+        <p:txBody>
+          <a:bodyPr wrap="none" rtlCol="0">
+            <a:spAutoFit/>
+          </a:bodyPr>
+          <a:lstStyle/>
+          <a:p>
+            <a:r>
+              <a:rPr lang="en-US" b="1" dirty="0"/>
+              <a:t>1. In general: </a:t>
+            </a:r>
+          </a:p>
+          <a:p>
+            <a:r>
+              <a:rPr lang="en-US" b="1" dirty="0"/>
+              <a:t>	Advection-diffusion-reaction</a:t>
+            </a:r>
+            <a:r>
+              <a:rPr lang="en-US" dirty="0"/>
+              <a:t> transport equation:</a:t>
+            </a:r>
+          </a:p>
+          <a:p>
+            <a:endParaRPr lang="en-US" dirty="0"/>
+          </a:p>
+          <a:p>
+            <a:endParaRPr lang="en-US" dirty="0"/>
+          </a:p>
+          <a:p>
+            <a:endParaRPr lang="en-US" dirty="0"/>
+          </a:p>
+          <a:p>
+            <a:r>
+              <a:rPr lang="en-US" dirty="0"/>
+              <a:t>	The </a:t>
+            </a:r>
+            <a:r>
+              <a:rPr lang="en-US" b="1" dirty="0"/>
+              <a:t>reaction terms</a:t>
+            </a:r>
+            <a:r>
+              <a:rPr lang="en-US" dirty="0"/>
+              <a:t> represent </a:t>
+            </a:r>
+            <a:r>
+              <a:rPr lang="en-US" b="1" dirty="0"/>
+              <a:t>sorption</a:t>
+            </a:r>
+            <a:r>
+              <a:rPr lang="en-US" dirty="0"/>
+              <a:t> and first-order rate reaction:</a:t>
+            </a:r>
+          </a:p>
+          <a:p>
+            <a:r>
+              <a:rPr lang="en-US" dirty="0"/>
+              <a:t> </a:t>
+            </a:r>
+          </a:p>
+          <a:p>
+            <a:endParaRPr lang="en-US" dirty="0"/>
+          </a:p>
+          <a:p>
+            <a:r>
+              <a:rPr lang="en-US" b="1" dirty="0"/>
+              <a:t>2. In our study:</a:t>
+            </a:r>
+          </a:p>
+          <a:p>
+            <a:r>
+              <a:rPr lang="en-US" b="1" dirty="0"/>
+              <a:t>	single specie, Freundlich sorption</a:t>
+            </a:r>
+            <a:r>
+              <a:rPr lang="en-US" dirty="0"/>
+              <a:t>, </a:t>
+            </a:r>
+            <a:r>
+              <a:rPr lang="en-US" b="1" dirty="0"/>
+              <a:t>no degradation:</a:t>
+            </a:r>
+          </a:p>
+          <a:p>
+            <a:endParaRPr lang="en-US" b="1" dirty="0"/>
+          </a:p>
+          <a:p>
+            <a:endParaRPr lang="en-US" b="1" dirty="0"/>
+          </a:p>
+          <a:p>
+            <a:endParaRPr lang="en-US" b="1" dirty="0"/>
+          </a:p>
+          <a:p>
+            <a:endParaRPr lang="en-US" b="1" dirty="0"/>
+          </a:p>
+          <a:p>
+            <a:endParaRPr lang="en-US" b="1" dirty="0"/>
+          </a:p>
+          <a:p>
+            <a:endParaRPr lang="en-US" b="1" dirty="0"/>
+          </a:p>
+          <a:p>
+            <a:r>
+              <a:rPr lang="en-US" b="1" dirty="0"/>
+              <a:t>	</a:t>
+            </a:r>
+            <a:r>
+              <a:rPr lang="en-US" dirty="0"/>
+              <a:t>Sorption constants: 0.1, 0.9 </a:t>
             </a:r>
           </a:p>
         </p:txBody>
       </p:sp>
       <p:pic>
         <p:nvPicPr>
-          <p:cNvPr id="5" name="Content Placeholder 4" descr="A picture containing light&#10;&#10;Description automatically generated">
-            <a:extLst>
-              <a:ext uri="{FF2B5EF4-FFF2-40B4-BE49-F238E27FC236}">
-                <a16:creationId xmlns:a16="http://schemas.microsoft.com/office/drawing/2014/main" id="{A3A1B217-3DB1-A64C-A7EE-4D0319AA7355}"/>
+          <p:cNvPr id="4" name="Picture 3">
+            <a:extLst>
+              <a:ext uri="{FF2B5EF4-FFF2-40B4-BE49-F238E27FC236}">
+                <a16:creationId xmlns:a16="http://schemas.microsoft.com/office/drawing/2014/main" id="{1743C4E2-2763-D449-875A-57E169E38558}"/>
               </a:ext>
             </a:extLst>
           </p:cNvPr>
           <p:cNvPicPr>
-            <a:picLocks noGrp="1" noChangeAspect="1"/>
+            <a:picLocks noChangeAspect="1"/>
           </p:cNvPicPr>
-          <p:nvPr>
-            <p:ph idx="1"/>
-          </p:nvPr>
+          <p:nvPr/>
         </p:nvPicPr>
-        <p:blipFill rotWithShape="1">
+        <p:blipFill>
           <a:blip r:embed="rId2"/>
-          <a:srcRect r="17783" b="50048"/>
-          <a:stretch/>
+          <a:stretch>
+            <a:fillRect/>
+          </a:stretch>
         </p:blipFill>
         <p:spPr>
           <a:xfrm>
-            <a:off x="937053" y="3327807"/>
-            <a:ext cx="2399271" cy="1325563"/>
-          </a:xfrm>
+            <a:off x="2910115" y="2163018"/>
+            <a:ext cx="5892800" cy="584200"/>
+          </a:xfrm>
+          <a:prstGeom prst="rect">
+            <a:avLst/>
+          </a:prstGeom>
         </p:spPr>
       </p:pic>
       <p:pic>
         <p:nvPicPr>
-          <p:cNvPr id="6" name="Picture 5" descr="Chart, diagram&#10;&#10;Description automatically generated">
-            <a:extLst>
-              <a:ext uri="{FF2B5EF4-FFF2-40B4-BE49-F238E27FC236}">
-                <a16:creationId xmlns:a16="http://schemas.microsoft.com/office/drawing/2014/main" id="{41C7D062-0584-EB47-AB7A-688623D7863F}"/>
+          <p:cNvPr id="5" name="Picture 4">
+            <a:extLst>
+              <a:ext uri="{FF2B5EF4-FFF2-40B4-BE49-F238E27FC236}">
+                <a16:creationId xmlns:a16="http://schemas.microsoft.com/office/drawing/2014/main" id="{AA606BEF-464C-4D4E-8FAF-C2C179BFFEA8}"/>
               </a:ext>
             </a:extLst>
           </p:cNvPr>
@@ -3929,8 +4938,1519 @@
         </p:blipFill>
         <p:spPr>
           <a:xfrm>
-            <a:off x="1276672" y="1822532"/>
-            <a:ext cx="2207933" cy="1470409"/>
+            <a:off x="3377584" y="3322253"/>
+            <a:ext cx="3352800" cy="520700"/>
+          </a:xfrm>
+          <a:prstGeom prst="rect">
+            <a:avLst/>
+          </a:prstGeom>
+        </p:spPr>
+      </p:pic>
+      <p:pic>
+        <p:nvPicPr>
+          <p:cNvPr id="6" name="Picture 5">
+            <a:extLst>
+              <a:ext uri="{FF2B5EF4-FFF2-40B4-BE49-F238E27FC236}">
+                <a16:creationId xmlns:a16="http://schemas.microsoft.com/office/drawing/2014/main" id="{DEBD1A34-5F29-3648-BDB3-B47A0214DC25}"/>
+              </a:ext>
+            </a:extLst>
+          </p:cNvPr>
+          <p:cNvPicPr>
+            <a:picLocks noChangeAspect="1"/>
+          </p:cNvPicPr>
+          <p:nvPr/>
+        </p:nvPicPr>
+        <p:blipFill>
+          <a:blip r:embed="rId4"/>
+          <a:stretch>
+            <a:fillRect/>
+          </a:stretch>
+        </p:blipFill>
+        <p:spPr>
+          <a:xfrm>
+            <a:off x="2717438" y="4716414"/>
+            <a:ext cx="7099300" cy="558800"/>
+          </a:xfrm>
+          <a:prstGeom prst="rect">
+            <a:avLst/>
+          </a:prstGeom>
+        </p:spPr>
+      </p:pic>
+      <p:pic>
+        <p:nvPicPr>
+          <p:cNvPr id="8" name="Picture 7">
+            <a:extLst>
+              <a:ext uri="{FF2B5EF4-FFF2-40B4-BE49-F238E27FC236}">
+                <a16:creationId xmlns:a16="http://schemas.microsoft.com/office/drawing/2014/main" id="{96A4F2A9-8CA7-1747-BAAD-DE58D6E32B2F}"/>
+              </a:ext>
+            </a:extLst>
+          </p:cNvPr>
+          <p:cNvPicPr>
+            <a:picLocks noChangeAspect="1"/>
+          </p:cNvPicPr>
+          <p:nvPr/>
+        </p:nvPicPr>
+        <p:blipFill>
+          <a:blip r:embed="rId5"/>
+          <a:stretch>
+            <a:fillRect/>
+          </a:stretch>
+        </p:blipFill>
+        <p:spPr>
+          <a:xfrm>
+            <a:off x="2717438" y="5480909"/>
+            <a:ext cx="1384300" cy="520700"/>
+          </a:xfrm>
+          <a:prstGeom prst="rect">
+            <a:avLst/>
+          </a:prstGeom>
+        </p:spPr>
+      </p:pic>
+      <p:pic>
+        <p:nvPicPr>
+          <p:cNvPr id="10" name="Picture 9">
+            <a:extLst>
+              <a:ext uri="{FF2B5EF4-FFF2-40B4-BE49-F238E27FC236}">
+                <a16:creationId xmlns:a16="http://schemas.microsoft.com/office/drawing/2014/main" id="{D50A3C80-283A-204E-B6FB-5409D72CB64E}"/>
+              </a:ext>
+            </a:extLst>
+          </p:cNvPr>
+          <p:cNvPicPr>
+            <a:picLocks noChangeAspect="1"/>
+          </p:cNvPicPr>
+          <p:nvPr/>
+        </p:nvPicPr>
+        <p:blipFill>
+          <a:blip r:embed="rId6"/>
+          <a:stretch>
+            <a:fillRect/>
+          </a:stretch>
+        </p:blipFill>
+        <p:spPr>
+          <a:xfrm>
+            <a:off x="4770372" y="5644969"/>
+            <a:ext cx="1066800" cy="266700"/>
+          </a:xfrm>
+          <a:prstGeom prst="rect">
+            <a:avLst/>
+          </a:prstGeom>
+        </p:spPr>
+      </p:pic>
+    </p:spTree>
+    <p:extLst>
+      <p:ext uri="{BB962C8B-B14F-4D97-AF65-F5344CB8AC3E}">
+        <p14:creationId xmlns:p14="http://schemas.microsoft.com/office/powerpoint/2010/main" val="3505408981"/>
+      </p:ext>
+    </p:extLst>
+  </p:cSld>
+  <p:clrMapOvr>
+    <a:masterClrMapping/>
+  </p:clrMapOvr>
+</p:sld>
+</file>
+
+<file path=ppt/slides/slide4.xml><?xml version="1.0" encoding="utf-8"?>
+<p:sld xmlns:a="http://schemas.openxmlformats.org/drawingml/2006/main" xmlns:r="http://schemas.openxmlformats.org/officeDocument/2006/relationships" xmlns:p="http://schemas.openxmlformats.org/presentationml/2006/main">
+  <p:cSld>
+    <p:spTree>
+      <p:nvGrpSpPr>
+        <p:cNvPr id="1" name=""/>
+        <p:cNvGrpSpPr/>
+        <p:nvPr/>
+      </p:nvGrpSpPr>
+      <p:grpSpPr>
+        <a:xfrm>
+          <a:off x="0" y="0"/>
+          <a:ext cx="0" cy="0"/>
+          <a:chOff x="0" y="0"/>
+          <a:chExt cx="0" cy="0"/>
+        </a:xfrm>
+      </p:grpSpPr>
+      <p:sp>
+        <p:nvSpPr>
+          <p:cNvPr id="2" name="Title 1">
+            <a:extLst>
+              <a:ext uri="{FF2B5EF4-FFF2-40B4-BE49-F238E27FC236}">
+                <a16:creationId xmlns:a16="http://schemas.microsoft.com/office/drawing/2014/main" id="{0BF5CEC8-D4D9-1544-AAA5-560559DE9128}"/>
+              </a:ext>
+            </a:extLst>
+          </p:cNvPr>
+          <p:cNvSpPr>
+            <a:spLocks noGrp="1"/>
+          </p:cNvSpPr>
+          <p:nvPr>
+            <p:ph type="title"/>
+          </p:nvPr>
+        </p:nvSpPr>
+        <p:spPr/>
+        <p:txBody>
+          <a:bodyPr/>
+          <a:lstStyle/>
+          <a:p>
+            <a:r>
+              <a:rPr lang="en-US" dirty="0"/>
+              <a:t>Forward 3D model visualization</a:t>
+            </a:r>
+          </a:p>
+        </p:txBody>
+      </p:sp>
+      <p:pic>
+        <p:nvPicPr>
+          <p:cNvPr id="7" name="Picture 6" descr="Chart, waterfall chart&#10;&#10;Description automatically generated">
+            <a:extLst>
+              <a:ext uri="{FF2B5EF4-FFF2-40B4-BE49-F238E27FC236}">
+                <a16:creationId xmlns:a16="http://schemas.microsoft.com/office/drawing/2014/main" id="{E1CF49D4-92DB-8A46-98DF-28937A76DE1D}"/>
+              </a:ext>
+            </a:extLst>
+          </p:cNvPr>
+          <p:cNvPicPr>
+            <a:picLocks noChangeAspect="1"/>
+          </p:cNvPicPr>
+          <p:nvPr/>
+        </p:nvPicPr>
+        <p:blipFill>
+          <a:blip r:embed="rId2"/>
+          <a:stretch>
+            <a:fillRect/>
+          </a:stretch>
+        </p:blipFill>
+        <p:spPr>
+          <a:xfrm>
+            <a:off x="101600" y="3487113"/>
+            <a:ext cx="11988800" cy="2628900"/>
+          </a:xfrm>
+          <a:prstGeom prst="rect">
+            <a:avLst/>
+          </a:prstGeom>
+        </p:spPr>
+      </p:pic>
+      <p:sp>
+        <p:nvSpPr>
+          <p:cNvPr id="8" name="TextBox 7">
+            <a:extLst>
+              <a:ext uri="{FF2B5EF4-FFF2-40B4-BE49-F238E27FC236}">
+                <a16:creationId xmlns:a16="http://schemas.microsoft.com/office/drawing/2014/main" id="{3728098B-DEDA-7442-9FA6-18D138926AFA}"/>
+              </a:ext>
+            </a:extLst>
+          </p:cNvPr>
+          <p:cNvSpPr txBox="1"/>
+          <p:nvPr/>
+        </p:nvSpPr>
+        <p:spPr>
+          <a:xfrm>
+            <a:off x="838200" y="1877302"/>
+            <a:ext cx="6569812" cy="1477328"/>
+          </a:xfrm>
+          <a:prstGeom prst="rect">
+            <a:avLst/>
+          </a:prstGeom>
+          <a:noFill/>
+        </p:spPr>
+        <p:txBody>
+          <a:bodyPr wrap="none" rtlCol="0">
+            <a:spAutoFit/>
+          </a:bodyPr>
+          <a:lstStyle/>
+          <a:p>
+            <a:r>
+              <a:rPr lang="en-US" dirty="0"/>
+              <a:t>Discretization: 300m*1250m*2500m; 6*41*81 grids</a:t>
+            </a:r>
+          </a:p>
+          <a:p>
+            <a:r>
+              <a:rPr lang="en-US" dirty="0"/>
+              <a:t>Source term: release from 1 of the injecting wells</a:t>
+            </a:r>
+          </a:p>
+          <a:p>
+            <a:r>
+              <a:rPr lang="en-US" dirty="0"/>
+              <a:t>Releasing time: 5 periods, 4 years each, with different concentration</a:t>
+            </a:r>
+          </a:p>
+          <a:p>
+            <a:r>
+              <a:rPr lang="en-US" dirty="0"/>
+              <a:t>Hydraulic conductivity: channelized, shown below</a:t>
+            </a:r>
+          </a:p>
+          <a:p>
+            <a:r>
+              <a:rPr lang="en-US" dirty="0"/>
+              <a:t>Time step: 4 years</a:t>
+            </a:r>
+          </a:p>
+        </p:txBody>
+      </p:sp>
+      <p:pic>
+        <p:nvPicPr>
+          <p:cNvPr id="4" name="Picture 3">
+            <a:extLst>
+              <a:ext uri="{FF2B5EF4-FFF2-40B4-BE49-F238E27FC236}">
+                <a16:creationId xmlns:a16="http://schemas.microsoft.com/office/drawing/2014/main" id="{E4A4CFDB-631F-454C-B9BC-3CBA0C833D27}"/>
+              </a:ext>
+            </a:extLst>
+          </p:cNvPr>
+          <p:cNvPicPr>
+            <a:picLocks noChangeAspect="1"/>
+          </p:cNvPicPr>
+          <p:nvPr/>
+        </p:nvPicPr>
+        <p:blipFill>
+          <a:blip r:embed="rId3"/>
+          <a:stretch>
+            <a:fillRect/>
+          </a:stretch>
+        </p:blipFill>
+        <p:spPr>
+          <a:xfrm>
+            <a:off x="8544378" y="1314398"/>
+            <a:ext cx="3070679" cy="1949848"/>
+          </a:xfrm>
+          <a:prstGeom prst="rect">
+            <a:avLst/>
+          </a:prstGeom>
+        </p:spPr>
+      </p:pic>
+      <p:sp>
+        <p:nvSpPr>
+          <p:cNvPr id="5" name="TextBox 4">
+            <a:extLst>
+              <a:ext uri="{FF2B5EF4-FFF2-40B4-BE49-F238E27FC236}">
+                <a16:creationId xmlns:a16="http://schemas.microsoft.com/office/drawing/2014/main" id="{390C528B-4F19-4643-B8C3-211674819DD6}"/>
+              </a:ext>
+            </a:extLst>
+          </p:cNvPr>
+          <p:cNvSpPr txBox="1"/>
+          <p:nvPr/>
+        </p:nvSpPr>
+        <p:spPr>
+          <a:xfrm>
+            <a:off x="8683524" y="2891356"/>
+            <a:ext cx="2931533" cy="671957"/>
+          </a:xfrm>
+          <a:prstGeom prst="rect">
+            <a:avLst/>
+          </a:prstGeom>
+          <a:noFill/>
+        </p:spPr>
+        <p:txBody>
+          <a:bodyPr wrap="square" rtlCol="0">
+            <a:spAutoFit/>
+          </a:bodyPr>
+          <a:lstStyle/>
+          <a:p>
+            <a:r>
+              <a:rPr lang="en-US" dirty="0"/>
+              <a:t>Hydraulic head profile; injecting well in the 4th layer</a:t>
+            </a:r>
+          </a:p>
+        </p:txBody>
+      </p:sp>
+    </p:spTree>
+    <p:extLst>
+      <p:ext uri="{BB962C8B-B14F-4D97-AF65-F5344CB8AC3E}">
+        <p14:creationId xmlns:p14="http://schemas.microsoft.com/office/powerpoint/2010/main" val="1689687065"/>
+      </p:ext>
+    </p:extLst>
+  </p:cSld>
+  <p:clrMapOvr>
+    <a:masterClrMapping/>
+  </p:clrMapOvr>
+</p:sld>
+</file>
+
+<file path=ppt/slides/slide5.xml><?xml version="1.0" encoding="utf-8"?>
+<p:sld xmlns:a="http://schemas.openxmlformats.org/drawingml/2006/main" xmlns:r="http://schemas.openxmlformats.org/officeDocument/2006/relationships" xmlns:p="http://schemas.openxmlformats.org/presentationml/2006/main">
+  <p:cSld>
+    <p:spTree>
+      <p:nvGrpSpPr>
+        <p:cNvPr id="1" name=""/>
+        <p:cNvGrpSpPr/>
+        <p:nvPr/>
+      </p:nvGrpSpPr>
+      <p:grpSpPr>
+        <a:xfrm>
+          <a:off x="0" y="0"/>
+          <a:ext cx="0" cy="0"/>
+          <a:chOff x="0" y="0"/>
+          <a:chExt cx="0" cy="0"/>
+        </a:xfrm>
+      </p:grpSpPr>
+      <p:sp>
+        <p:nvSpPr>
+          <p:cNvPr id="2" name="Title 1">
+            <a:extLst>
+              <a:ext uri="{FF2B5EF4-FFF2-40B4-BE49-F238E27FC236}">
+                <a16:creationId xmlns:a16="http://schemas.microsoft.com/office/drawing/2014/main" id="{85FA77AC-38AC-A743-8889-DB84EA8F0EF0}"/>
+              </a:ext>
+            </a:extLst>
+          </p:cNvPr>
+          <p:cNvSpPr>
+            <a:spLocks noGrp="1"/>
+          </p:cNvSpPr>
+          <p:nvPr>
+            <p:ph type="title"/>
+          </p:nvPr>
+        </p:nvSpPr>
+        <p:spPr/>
+        <p:txBody>
+          <a:bodyPr/>
+          <a:lstStyle/>
+          <a:p>
+            <a:r>
+              <a:rPr lang="en-US" dirty="0"/>
+              <a:t>Problem description</a:t>
+            </a:r>
+          </a:p>
+        </p:txBody>
+      </p:sp>
+      <p:sp>
+        <p:nvSpPr>
+          <p:cNvPr id="3" name="TextBox 2">
+            <a:extLst>
+              <a:ext uri="{FF2B5EF4-FFF2-40B4-BE49-F238E27FC236}">
+                <a16:creationId xmlns:a16="http://schemas.microsoft.com/office/drawing/2014/main" id="{BC452354-E10C-D44A-B98D-B5257479C6B6}"/>
+              </a:ext>
+            </a:extLst>
+          </p:cNvPr>
+          <p:cNvSpPr txBox="1"/>
+          <p:nvPr/>
+        </p:nvSpPr>
+        <p:spPr>
+          <a:xfrm>
+            <a:off x="1147762" y="1681053"/>
+            <a:ext cx="6367705" cy="369332"/>
+          </a:xfrm>
+          <a:prstGeom prst="rect">
+            <a:avLst/>
+          </a:prstGeom>
+          <a:noFill/>
+        </p:spPr>
+        <p:txBody>
+          <a:bodyPr wrap="none" rtlCol="0">
+            <a:spAutoFit/>
+          </a:bodyPr>
+          <a:lstStyle/>
+          <a:p>
+            <a:r>
+              <a:rPr lang="en-US" i="1" dirty="0"/>
+              <a:t>Measurements</a:t>
+            </a:r>
+            <a:r>
+              <a:rPr lang="en-US" dirty="0"/>
+              <a:t> on </a:t>
+            </a:r>
+            <a:r>
+              <a:rPr lang="en-US" dirty="0" err="1"/>
+              <a:t>x_i</a:t>
+            </a:r>
+            <a:r>
+              <a:rPr lang="en-US" dirty="0"/>
+              <a:t> locations: concentration and hydraulic head</a:t>
+            </a:r>
+          </a:p>
+        </p:txBody>
+      </p:sp>
+      <p:pic>
+        <p:nvPicPr>
+          <p:cNvPr id="6" name="Picture 5">
+            <a:extLst>
+              <a:ext uri="{FF2B5EF4-FFF2-40B4-BE49-F238E27FC236}">
+                <a16:creationId xmlns:a16="http://schemas.microsoft.com/office/drawing/2014/main" id="{629A479D-2A0D-4D40-A14B-F5F7DCFDBDFB}"/>
+              </a:ext>
+            </a:extLst>
+          </p:cNvPr>
+          <p:cNvPicPr>
+            <a:picLocks noChangeAspect="1"/>
+          </p:cNvPicPr>
+          <p:nvPr/>
+        </p:nvPicPr>
+        <p:blipFill>
+          <a:blip r:embed="rId2"/>
+          <a:stretch>
+            <a:fillRect/>
+          </a:stretch>
+        </p:blipFill>
+        <p:spPr>
+          <a:xfrm>
+            <a:off x="2701925" y="2050385"/>
+            <a:ext cx="3644900" cy="584200"/>
+          </a:xfrm>
+          <a:prstGeom prst="rect">
+            <a:avLst/>
+          </a:prstGeom>
+        </p:spPr>
+      </p:pic>
+      <p:sp>
+        <p:nvSpPr>
+          <p:cNvPr id="7" name="TextBox 6">
+            <a:extLst>
+              <a:ext uri="{FF2B5EF4-FFF2-40B4-BE49-F238E27FC236}">
+                <a16:creationId xmlns:a16="http://schemas.microsoft.com/office/drawing/2014/main" id="{2D675F6C-A412-3C4C-9F25-DF32D40E6714}"/>
+              </a:ext>
+            </a:extLst>
+          </p:cNvPr>
+          <p:cNvSpPr txBox="1"/>
+          <p:nvPr/>
+        </p:nvSpPr>
+        <p:spPr>
+          <a:xfrm>
+            <a:off x="1147762" y="2875112"/>
+            <a:ext cx="8103565" cy="2862322"/>
+          </a:xfrm>
+          <a:prstGeom prst="rect">
+            <a:avLst/>
+          </a:prstGeom>
+          <a:noFill/>
+        </p:spPr>
+        <p:txBody>
+          <a:bodyPr wrap="none" rtlCol="0">
+            <a:spAutoFit/>
+          </a:bodyPr>
+          <a:lstStyle/>
+          <a:p>
+            <a:r>
+              <a:rPr lang="en-US" i="1" dirty="0"/>
+              <a:t>Unknowns</a:t>
+            </a:r>
+            <a:r>
+              <a:rPr lang="en-US" dirty="0"/>
+              <a:t>: injecting concentration and hydraulic conductivity field</a:t>
+            </a:r>
+          </a:p>
+          <a:p>
+            <a:endParaRPr lang="en-US" dirty="0"/>
+          </a:p>
+          <a:p>
+            <a:endParaRPr lang="en-US" dirty="0"/>
+          </a:p>
+          <a:p>
+            <a:endParaRPr lang="en-US" dirty="0"/>
+          </a:p>
+          <a:p>
+            <a:r>
+              <a:rPr lang="en-US" dirty="0"/>
+              <a:t>	1 location &amp;&amp; 5 release concentration &amp;&amp; 6*41*81 </a:t>
+            </a:r>
+            <a:r>
+              <a:rPr lang="en-US" dirty="0" err="1"/>
+              <a:t>hk</a:t>
+            </a:r>
+            <a:r>
+              <a:rPr lang="en-US" dirty="0"/>
+              <a:t> ~ 19932 parameters</a:t>
+            </a:r>
+          </a:p>
+          <a:p>
+            <a:endParaRPr lang="en-US" i="1" dirty="0"/>
+          </a:p>
+          <a:p>
+            <a:r>
+              <a:rPr lang="en-US" i="1" dirty="0"/>
+              <a:t>Uncertainty quantification</a:t>
+            </a:r>
+            <a:r>
+              <a:rPr lang="en-US" dirty="0"/>
+              <a:t>:</a:t>
+            </a:r>
+          </a:p>
+          <a:p>
+            <a:r>
+              <a:rPr lang="en-US" dirty="0"/>
+              <a:t>	distribution of the unknow parameters</a:t>
+            </a:r>
+          </a:p>
+          <a:p>
+            <a:endParaRPr lang="en-US" i="1" dirty="0"/>
+          </a:p>
+          <a:p>
+            <a:r>
+              <a:rPr lang="en-US" i="1" dirty="0"/>
+              <a:t>Challenge</a:t>
+            </a:r>
+            <a:r>
+              <a:rPr lang="en-US" dirty="0"/>
+              <a:t>: parameterization of the 3D conductivity field</a:t>
+            </a:r>
+          </a:p>
+        </p:txBody>
+      </p:sp>
+      <p:pic>
+        <p:nvPicPr>
+          <p:cNvPr id="8" name="Picture 7">
+            <a:extLst>
+              <a:ext uri="{FF2B5EF4-FFF2-40B4-BE49-F238E27FC236}">
+                <a16:creationId xmlns:a16="http://schemas.microsoft.com/office/drawing/2014/main" id="{3DE426E4-A8C8-2F4C-8A54-823347B5EF93}"/>
+              </a:ext>
+            </a:extLst>
+          </p:cNvPr>
+          <p:cNvPicPr>
+            <a:picLocks noChangeAspect="1"/>
+          </p:cNvPicPr>
+          <p:nvPr/>
+        </p:nvPicPr>
+        <p:blipFill>
+          <a:blip r:embed="rId3"/>
+          <a:stretch>
+            <a:fillRect/>
+          </a:stretch>
+        </p:blipFill>
+        <p:spPr>
+          <a:xfrm>
+            <a:off x="2701925" y="3191282"/>
+            <a:ext cx="5016500" cy="584200"/>
+          </a:xfrm>
+          <a:prstGeom prst="rect">
+            <a:avLst/>
+          </a:prstGeom>
+        </p:spPr>
+      </p:pic>
+    </p:spTree>
+    <p:extLst>
+      <p:ext uri="{BB962C8B-B14F-4D97-AF65-F5344CB8AC3E}">
+        <p14:creationId xmlns:p14="http://schemas.microsoft.com/office/powerpoint/2010/main" val="3277345797"/>
+      </p:ext>
+    </p:extLst>
+  </p:cSld>
+  <p:clrMapOvr>
+    <a:masterClrMapping/>
+  </p:clrMapOvr>
+</p:sld>
+</file>
+
+<file path=ppt/slides/slide6.xml><?xml version="1.0" encoding="utf-8"?>
+<p:sld xmlns:a="http://schemas.openxmlformats.org/drawingml/2006/main" xmlns:r="http://schemas.openxmlformats.org/officeDocument/2006/relationships" xmlns:p="http://schemas.openxmlformats.org/presentationml/2006/main">
+  <p:cSld>
+    <p:spTree>
+      <p:nvGrpSpPr>
+        <p:cNvPr id="1" name=""/>
+        <p:cNvGrpSpPr/>
+        <p:nvPr/>
+      </p:nvGrpSpPr>
+      <p:grpSpPr>
+        <a:xfrm>
+          <a:off x="0" y="0"/>
+          <a:ext cx="0" cy="0"/>
+          <a:chOff x="0" y="0"/>
+          <a:chExt cx="0" cy="0"/>
+        </a:xfrm>
+      </p:grpSpPr>
+      <p:pic>
+        <p:nvPicPr>
+          <p:cNvPr id="5" name="Picture 4" descr="Chart, diagram&#10;&#10;Description automatically generated">
+            <a:extLst>
+              <a:ext uri="{FF2B5EF4-FFF2-40B4-BE49-F238E27FC236}">
+                <a16:creationId xmlns:a16="http://schemas.microsoft.com/office/drawing/2014/main" id="{1B2DACDD-F1AA-2440-A75E-76C229DCAB27}"/>
+              </a:ext>
+            </a:extLst>
+          </p:cNvPr>
+          <p:cNvPicPr>
+            <a:picLocks noChangeAspect="1"/>
+          </p:cNvPicPr>
+          <p:nvPr/>
+        </p:nvPicPr>
+        <p:blipFill>
+          <a:blip r:embed="rId2"/>
+          <a:stretch>
+            <a:fillRect/>
+          </a:stretch>
+        </p:blipFill>
+        <p:spPr>
+          <a:xfrm>
+            <a:off x="1342107" y="2226081"/>
+            <a:ext cx="3089071" cy="2057217"/>
+          </a:xfrm>
+          <a:prstGeom prst="rect">
+            <a:avLst/>
+          </a:prstGeom>
+        </p:spPr>
+      </p:pic>
+      <p:sp>
+        <p:nvSpPr>
+          <p:cNvPr id="6" name="TextBox 5">
+            <a:extLst>
+              <a:ext uri="{FF2B5EF4-FFF2-40B4-BE49-F238E27FC236}">
+                <a16:creationId xmlns:a16="http://schemas.microsoft.com/office/drawing/2014/main" id="{01489B4A-2A89-9744-9002-F138C9CC6726}"/>
+              </a:ext>
+            </a:extLst>
+          </p:cNvPr>
+          <p:cNvSpPr txBox="1"/>
+          <p:nvPr/>
+        </p:nvSpPr>
+        <p:spPr>
+          <a:xfrm>
+            <a:off x="2295559" y="4283298"/>
+            <a:ext cx="1641632" cy="646331"/>
+          </a:xfrm>
+          <a:prstGeom prst="rect">
+            <a:avLst/>
+          </a:prstGeom>
+          <a:noFill/>
+        </p:spPr>
+        <p:txBody>
+          <a:bodyPr wrap="square" rtlCol="0">
+            <a:spAutoFit/>
+          </a:bodyPr>
+          <a:lstStyle/>
+          <a:p>
+            <a:r>
+              <a:rPr lang="en-US" dirty="0"/>
+              <a:t>Conductivity field: 6*41*81</a:t>
+            </a:r>
+          </a:p>
+        </p:txBody>
+      </p:sp>
+      <p:sp>
+        <p:nvSpPr>
+          <p:cNvPr id="7" name="Rounded Rectangle 6">
+            <a:extLst>
+              <a:ext uri="{FF2B5EF4-FFF2-40B4-BE49-F238E27FC236}">
+                <a16:creationId xmlns:a16="http://schemas.microsoft.com/office/drawing/2014/main" id="{681E39A5-31E2-E44E-86F0-F3108677B0E1}"/>
+              </a:ext>
+            </a:extLst>
+          </p:cNvPr>
+          <p:cNvSpPr/>
+          <p:nvPr/>
+        </p:nvSpPr>
+        <p:spPr>
+          <a:xfrm>
+            <a:off x="5931243" y="1538738"/>
+            <a:ext cx="164757" cy="3459207"/>
+          </a:xfrm>
+          <a:prstGeom prst="roundRect">
+            <a:avLst/>
+          </a:prstGeom>
+          <a:solidFill>
+            <a:schemeClr val="accent1"/>
+          </a:solidFill>
+        </p:spPr>
+        <p:style>
+          <a:lnRef idx="2">
+            <a:schemeClr val="accent1">
+              <a:shade val="50000"/>
+            </a:schemeClr>
+          </a:lnRef>
+          <a:fillRef idx="1">
+            <a:schemeClr val="accent1"/>
+          </a:fillRef>
+          <a:effectRef idx="0">
+            <a:schemeClr val="accent1"/>
+          </a:effectRef>
+          <a:fontRef idx="minor">
+            <a:schemeClr val="lt1"/>
+          </a:fontRef>
+        </p:style>
+        <p:txBody>
+          <a:bodyPr rtlCol="0" anchor="ctr"/>
+          <a:lstStyle/>
+          <a:p>
+            <a:pPr algn="ctr"/>
+            <a:endParaRPr lang="en-US" dirty="0"/>
+          </a:p>
+        </p:txBody>
+      </p:sp>
+      <p:sp>
+        <p:nvSpPr>
+          <p:cNvPr id="8" name="TextBox 7">
+            <a:extLst>
+              <a:ext uri="{FF2B5EF4-FFF2-40B4-BE49-F238E27FC236}">
+                <a16:creationId xmlns:a16="http://schemas.microsoft.com/office/drawing/2014/main" id="{0D70B213-28BF-824D-8DA6-8170A7F080A4}"/>
+              </a:ext>
+            </a:extLst>
+          </p:cNvPr>
+          <p:cNvSpPr txBox="1"/>
+          <p:nvPr/>
+        </p:nvSpPr>
+        <p:spPr>
+          <a:xfrm>
+            <a:off x="6057159" y="4350667"/>
+            <a:ext cx="1121910" cy="646331"/>
+          </a:xfrm>
+          <a:prstGeom prst="rect">
+            <a:avLst/>
+          </a:prstGeom>
+          <a:noFill/>
+        </p:spPr>
+        <p:txBody>
+          <a:bodyPr wrap="none" rtlCol="0">
+            <a:spAutoFit/>
+          </a:bodyPr>
+          <a:lstStyle/>
+          <a:p>
+            <a:pPr algn="ctr"/>
+            <a:r>
+              <a:rPr lang="en-US" dirty="0"/>
+              <a:t>Latent var</a:t>
+            </a:r>
+          </a:p>
+          <a:p>
+            <a:pPr algn="ctr"/>
+            <a:r>
+              <a:rPr lang="en-US" dirty="0"/>
+              <a:t> </a:t>
+            </a:r>
+            <a:r>
+              <a:rPr lang="en-US" b="1" dirty="0"/>
+              <a:t>z</a:t>
+            </a:r>
+            <a:r>
+              <a:rPr lang="en-US" dirty="0"/>
+              <a:t>: 924*1</a:t>
+            </a:r>
+          </a:p>
+        </p:txBody>
+      </p:sp>
+      <p:pic>
+        <p:nvPicPr>
+          <p:cNvPr id="9" name="Picture 8" descr="Chart, diagram&#10;&#10;Description automatically generated">
+            <a:extLst>
+              <a:ext uri="{FF2B5EF4-FFF2-40B4-BE49-F238E27FC236}">
+                <a16:creationId xmlns:a16="http://schemas.microsoft.com/office/drawing/2014/main" id="{95607034-70BB-1542-8F32-3AF57ADB64AA}"/>
+              </a:ext>
+            </a:extLst>
+          </p:cNvPr>
+          <p:cNvPicPr>
+            <a:picLocks noChangeAspect="1"/>
+          </p:cNvPicPr>
+          <p:nvPr/>
+        </p:nvPicPr>
+        <p:blipFill>
+          <a:blip r:embed="rId2"/>
+          <a:stretch>
+            <a:fillRect/>
+          </a:stretch>
+        </p:blipFill>
+        <p:spPr>
+          <a:xfrm>
+            <a:off x="7347037" y="2253092"/>
+            <a:ext cx="3089071" cy="2057217"/>
+          </a:xfrm>
+          <a:prstGeom prst="rect">
+            <a:avLst/>
+          </a:prstGeom>
+        </p:spPr>
+      </p:pic>
+      <p:sp>
+        <p:nvSpPr>
+          <p:cNvPr id="10" name="TextBox 9">
+            <a:extLst>
+              <a:ext uri="{FF2B5EF4-FFF2-40B4-BE49-F238E27FC236}">
+                <a16:creationId xmlns:a16="http://schemas.microsoft.com/office/drawing/2014/main" id="{0AE721B4-BBD5-8444-8A02-E79C59ED4CF0}"/>
+              </a:ext>
+            </a:extLst>
+          </p:cNvPr>
+          <p:cNvSpPr txBox="1"/>
+          <p:nvPr/>
+        </p:nvSpPr>
+        <p:spPr>
+          <a:xfrm>
+            <a:off x="8457058" y="4283297"/>
+            <a:ext cx="1670726" cy="646331"/>
+          </a:xfrm>
+          <a:prstGeom prst="rect">
+            <a:avLst/>
+          </a:prstGeom>
+          <a:noFill/>
+        </p:spPr>
+        <p:txBody>
+          <a:bodyPr wrap="square" rtlCol="0">
+            <a:spAutoFit/>
+          </a:bodyPr>
+          <a:lstStyle/>
+          <a:p>
+            <a:r>
+              <a:rPr lang="en-US" dirty="0"/>
+              <a:t>Conductivity field: 6*41*81</a:t>
+            </a:r>
+          </a:p>
+        </p:txBody>
+      </p:sp>
+      <p:cxnSp>
+        <p:nvCxnSpPr>
+          <p:cNvPr id="12" name="Straight Arrow Connector 11">
+            <a:extLst>
+              <a:ext uri="{FF2B5EF4-FFF2-40B4-BE49-F238E27FC236}">
+                <a16:creationId xmlns:a16="http://schemas.microsoft.com/office/drawing/2014/main" id="{FB381EFF-012C-2742-87E8-177655A000F0}"/>
+              </a:ext>
+            </a:extLst>
+          </p:cNvPr>
+          <p:cNvCxnSpPr>
+            <a:stCxn id="5" idx="3"/>
+            <a:endCxn id="7" idx="1"/>
+          </p:cNvCxnSpPr>
+          <p:nvPr/>
+        </p:nvCxnSpPr>
+        <p:spPr>
+          <a:xfrm>
+            <a:off x="4431178" y="3254690"/>
+            <a:ext cx="1500065" cy="13652"/>
+          </a:xfrm>
+          <a:prstGeom prst="straightConnector1">
+            <a:avLst/>
+          </a:prstGeom>
+          <a:ln>
+            <a:tailEnd type="triangle"/>
+          </a:ln>
+        </p:spPr>
+        <p:style>
+          <a:lnRef idx="1">
+            <a:schemeClr val="accent1"/>
+          </a:lnRef>
+          <a:fillRef idx="0">
+            <a:schemeClr val="accent1"/>
+          </a:fillRef>
+          <a:effectRef idx="0">
+            <a:schemeClr val="accent1"/>
+          </a:effectRef>
+          <a:fontRef idx="minor">
+            <a:schemeClr val="tx1"/>
+          </a:fontRef>
+        </p:style>
+      </p:cxnSp>
+      <p:sp>
+        <p:nvSpPr>
+          <p:cNvPr id="13" name="TextBox 12">
+            <a:extLst>
+              <a:ext uri="{FF2B5EF4-FFF2-40B4-BE49-F238E27FC236}">
+                <a16:creationId xmlns:a16="http://schemas.microsoft.com/office/drawing/2014/main" id="{6F091EF9-4E50-EE41-8CB3-48DD0405579B}"/>
+              </a:ext>
+            </a:extLst>
+          </p:cNvPr>
+          <p:cNvSpPr txBox="1"/>
+          <p:nvPr/>
+        </p:nvSpPr>
+        <p:spPr>
+          <a:xfrm>
+            <a:off x="4729649" y="2966085"/>
+            <a:ext cx="956993" cy="369332"/>
+          </a:xfrm>
+          <a:prstGeom prst="rect">
+            <a:avLst/>
+          </a:prstGeom>
+          <a:noFill/>
+        </p:spPr>
+        <p:txBody>
+          <a:bodyPr wrap="none" rtlCol="0">
+            <a:spAutoFit/>
+          </a:bodyPr>
+          <a:lstStyle/>
+          <a:p>
+            <a:r>
+              <a:rPr lang="en-US" dirty="0"/>
+              <a:t>encoder</a:t>
+            </a:r>
+          </a:p>
+        </p:txBody>
+      </p:sp>
+      <p:cxnSp>
+        <p:nvCxnSpPr>
+          <p:cNvPr id="14" name="Straight Arrow Connector 13">
+            <a:extLst>
+              <a:ext uri="{FF2B5EF4-FFF2-40B4-BE49-F238E27FC236}">
+                <a16:creationId xmlns:a16="http://schemas.microsoft.com/office/drawing/2014/main" id="{FFB870AC-9076-9046-8137-64817AECD676}"/>
+              </a:ext>
+            </a:extLst>
+          </p:cNvPr>
+          <p:cNvCxnSpPr>
+            <a:cxnSpLocks/>
+            <a:stCxn id="7" idx="3"/>
+            <a:endCxn id="9" idx="1"/>
+          </p:cNvCxnSpPr>
+          <p:nvPr/>
+        </p:nvCxnSpPr>
+        <p:spPr>
+          <a:xfrm>
+            <a:off x="6096000" y="3268342"/>
+            <a:ext cx="1251037" cy="13359"/>
+          </a:xfrm>
+          <a:prstGeom prst="straightConnector1">
+            <a:avLst/>
+          </a:prstGeom>
+          <a:ln>
+            <a:tailEnd type="triangle"/>
+          </a:ln>
+        </p:spPr>
+        <p:style>
+          <a:lnRef idx="1">
+            <a:schemeClr val="accent1"/>
+          </a:lnRef>
+          <a:fillRef idx="0">
+            <a:schemeClr val="accent1"/>
+          </a:fillRef>
+          <a:effectRef idx="0">
+            <a:schemeClr val="accent1"/>
+          </a:effectRef>
+          <a:fontRef idx="minor">
+            <a:schemeClr val="tx1"/>
+          </a:fontRef>
+        </p:style>
+      </p:cxnSp>
+      <p:sp>
+        <p:nvSpPr>
+          <p:cNvPr id="15" name="TextBox 14">
+            <a:extLst>
+              <a:ext uri="{FF2B5EF4-FFF2-40B4-BE49-F238E27FC236}">
+                <a16:creationId xmlns:a16="http://schemas.microsoft.com/office/drawing/2014/main" id="{73A61B19-365F-6A4B-8CA1-A540BA2FE7D8}"/>
+              </a:ext>
+            </a:extLst>
+          </p:cNvPr>
+          <p:cNvSpPr txBox="1"/>
+          <p:nvPr/>
+        </p:nvSpPr>
+        <p:spPr>
+          <a:xfrm>
+            <a:off x="6225287" y="2966085"/>
+            <a:ext cx="956993" cy="369332"/>
+          </a:xfrm>
+          <a:prstGeom prst="rect">
+            <a:avLst/>
+          </a:prstGeom>
+          <a:noFill/>
+        </p:spPr>
+        <p:txBody>
+          <a:bodyPr wrap="square" rtlCol="0">
+            <a:spAutoFit/>
+          </a:bodyPr>
+          <a:lstStyle/>
+          <a:p>
+            <a:r>
+              <a:rPr lang="en-US" dirty="0"/>
+              <a:t>decoder</a:t>
+            </a:r>
+          </a:p>
+        </p:txBody>
+      </p:sp>
+      <p:sp>
+        <p:nvSpPr>
+          <p:cNvPr id="16" name="Title 1">
+            <a:extLst>
+              <a:ext uri="{FF2B5EF4-FFF2-40B4-BE49-F238E27FC236}">
+                <a16:creationId xmlns:a16="http://schemas.microsoft.com/office/drawing/2014/main" id="{E98E5538-B413-2849-9F53-08000196D5E8}"/>
+              </a:ext>
+            </a:extLst>
+          </p:cNvPr>
+          <p:cNvSpPr>
+            <a:spLocks noGrp="1"/>
+          </p:cNvSpPr>
+          <p:nvPr>
+            <p:ph type="title"/>
+          </p:nvPr>
+        </p:nvSpPr>
+        <p:spPr>
+          <a:xfrm>
+            <a:off x="838200" y="365125"/>
+            <a:ext cx="10515600" cy="1325563"/>
+          </a:xfrm>
+        </p:spPr>
+        <p:txBody>
+          <a:bodyPr>
+            <a:normAutofit/>
+          </a:bodyPr>
+          <a:lstStyle/>
+          <a:p>
+            <a:r>
+              <a:rPr lang="en-US" dirty="0"/>
+              <a:t>Parameterization of the conductivity field:</a:t>
+            </a:r>
+            <a:br>
+              <a:rPr lang="en-US" dirty="0"/>
+            </a:br>
+            <a:r>
+              <a:rPr lang="en-US" sz="2400" dirty="0"/>
+              <a:t>Convolutional adversarial autoencoder(CAAE)</a:t>
+            </a:r>
+          </a:p>
+        </p:txBody>
+      </p:sp>
+      <p:sp>
+        <p:nvSpPr>
+          <p:cNvPr id="3" name="TextBox 2">
+            <a:extLst>
+              <a:ext uri="{FF2B5EF4-FFF2-40B4-BE49-F238E27FC236}">
+                <a16:creationId xmlns:a16="http://schemas.microsoft.com/office/drawing/2014/main" id="{91F394E6-D993-0442-BEB2-EA53ED5BAA9A}"/>
+              </a:ext>
+            </a:extLst>
+          </p:cNvPr>
+          <p:cNvSpPr txBox="1"/>
+          <p:nvPr/>
+        </p:nvSpPr>
+        <p:spPr>
+          <a:xfrm>
+            <a:off x="842334" y="5202821"/>
+            <a:ext cx="10610662" cy="1477328"/>
+          </a:xfrm>
+          <a:prstGeom prst="rect">
+            <a:avLst/>
+          </a:prstGeom>
+          <a:noFill/>
+        </p:spPr>
+        <p:txBody>
+          <a:bodyPr wrap="none" rtlCol="0">
+            <a:spAutoFit/>
+          </a:bodyPr>
+          <a:lstStyle/>
+          <a:p>
+            <a:r>
+              <a:rPr lang="en-US" dirty="0"/>
+              <a:t>x: the conductivity field. </a:t>
+            </a:r>
+            <a:r>
+              <a:rPr lang="en-US" dirty="0" err="1"/>
+              <a:t>p_data</a:t>
+            </a:r>
+            <a:r>
+              <a:rPr lang="en-US" dirty="0"/>
+              <a:t>(x): the data distribution, high dimensional, with complicated spatial correlation</a:t>
+            </a:r>
+          </a:p>
+          <a:p>
+            <a:r>
+              <a:rPr lang="en-US" dirty="0"/>
+              <a:t>  </a:t>
+            </a:r>
+          </a:p>
+          <a:p>
+            <a:endParaRPr lang="en-US" dirty="0"/>
+          </a:p>
+          <a:p>
+            <a:r>
+              <a:rPr lang="en-US" dirty="0"/>
+              <a:t>D: discriminator, computes if the sample x is from </a:t>
+            </a:r>
+            <a:r>
+              <a:rPr lang="en-US" dirty="0" err="1"/>
+              <a:t>p_data</a:t>
+            </a:r>
+            <a:r>
+              <a:rPr lang="en-US" dirty="0"/>
+              <a:t>(x);</a:t>
+            </a:r>
+          </a:p>
+          <a:p>
+            <a:r>
+              <a:rPr lang="en-US" dirty="0"/>
+              <a:t>G: generator, the decoder in the above image.</a:t>
+            </a:r>
+          </a:p>
+        </p:txBody>
+      </p:sp>
+      <p:pic>
+        <p:nvPicPr>
+          <p:cNvPr id="4" name="Picture 3">
+            <a:extLst>
+              <a:ext uri="{FF2B5EF4-FFF2-40B4-BE49-F238E27FC236}">
+                <a16:creationId xmlns:a16="http://schemas.microsoft.com/office/drawing/2014/main" id="{11270424-40A3-D946-AED5-B147AFF11AA0}"/>
+              </a:ext>
+            </a:extLst>
+          </p:cNvPr>
+          <p:cNvPicPr>
+            <a:picLocks noChangeAspect="1"/>
+          </p:cNvPicPr>
+          <p:nvPr/>
+        </p:nvPicPr>
+        <p:blipFill>
+          <a:blip r:embed="rId3"/>
+          <a:stretch>
+            <a:fillRect/>
+          </a:stretch>
+        </p:blipFill>
+        <p:spPr>
+          <a:xfrm>
+            <a:off x="3116375" y="5551103"/>
+            <a:ext cx="6070600" cy="431800"/>
+          </a:xfrm>
+          <a:prstGeom prst="rect">
+            <a:avLst/>
+          </a:prstGeom>
+        </p:spPr>
+      </p:pic>
+    </p:spTree>
+    <p:extLst>
+      <p:ext uri="{BB962C8B-B14F-4D97-AF65-F5344CB8AC3E}">
+        <p14:creationId xmlns:p14="http://schemas.microsoft.com/office/powerpoint/2010/main" val="2758145827"/>
+      </p:ext>
+    </p:extLst>
+  </p:cSld>
+  <p:clrMapOvr>
+    <a:masterClrMapping/>
+  </p:clrMapOvr>
+</p:sld>
+</file>
+
+<file path=ppt/slides/slide7.xml><?xml version="1.0" encoding="utf-8"?>
+<p:sld xmlns:a="http://schemas.openxmlformats.org/drawingml/2006/main" xmlns:r="http://schemas.openxmlformats.org/officeDocument/2006/relationships" xmlns:p="http://schemas.openxmlformats.org/presentationml/2006/main">
+  <p:cSld>
+    <p:spTree>
+      <p:nvGrpSpPr>
+        <p:cNvPr id="1" name=""/>
+        <p:cNvGrpSpPr/>
+        <p:nvPr/>
+      </p:nvGrpSpPr>
+      <p:grpSpPr>
+        <a:xfrm>
+          <a:off x="0" y="0"/>
+          <a:ext cx="0" cy="0"/>
+          <a:chOff x="0" y="0"/>
+          <a:chExt cx="0" cy="0"/>
+        </a:xfrm>
+      </p:grpSpPr>
+      <p:sp>
+        <p:nvSpPr>
+          <p:cNvPr id="2" name="Title 1">
+            <a:extLst>
+              <a:ext uri="{FF2B5EF4-FFF2-40B4-BE49-F238E27FC236}">
+                <a16:creationId xmlns:a16="http://schemas.microsoft.com/office/drawing/2014/main" id="{B4CE05A2-0D19-2546-B2E6-8539B844B424}"/>
+              </a:ext>
+            </a:extLst>
+          </p:cNvPr>
+          <p:cNvSpPr>
+            <a:spLocks noGrp="1"/>
+          </p:cNvSpPr>
+          <p:nvPr>
+            <p:ph type="title"/>
+          </p:nvPr>
+        </p:nvSpPr>
+        <p:spPr/>
+        <p:txBody>
+          <a:bodyPr/>
+          <a:lstStyle/>
+          <a:p>
+            <a:r>
+              <a:rPr lang="en-US" dirty="0"/>
+              <a:t>Bayesian Surrogate neural network </a:t>
+            </a:r>
+          </a:p>
+        </p:txBody>
+      </p:sp>
+      <p:sp>
+        <p:nvSpPr>
+          <p:cNvPr id="7" name="TextBox 6">
+            <a:extLst>
+              <a:ext uri="{FF2B5EF4-FFF2-40B4-BE49-F238E27FC236}">
+                <a16:creationId xmlns:a16="http://schemas.microsoft.com/office/drawing/2014/main" id="{9CADEC59-E1A2-484B-AFAA-ECC994515A5A}"/>
+              </a:ext>
+            </a:extLst>
+          </p:cNvPr>
+          <p:cNvSpPr txBox="1"/>
+          <p:nvPr/>
+        </p:nvSpPr>
+        <p:spPr>
+          <a:xfrm>
+            <a:off x="804795" y="1889090"/>
+            <a:ext cx="4005071" cy="4031873"/>
+          </a:xfrm>
+          <a:prstGeom prst="rect">
+            <a:avLst/>
+          </a:prstGeom>
+          <a:noFill/>
+        </p:spPr>
+        <p:txBody>
+          <a:bodyPr wrap="none" rtlCol="0">
+            <a:spAutoFit/>
+          </a:bodyPr>
+          <a:lstStyle/>
+          <a:p>
+            <a:pPr algn="r"/>
+            <a:r>
+              <a:rPr lang="en-US" altLang="zh-CN" dirty="0"/>
+              <a:t>Dataset: </a:t>
+            </a:r>
+          </a:p>
+          <a:p>
+            <a:pPr algn="r"/>
+            <a:endParaRPr lang="en-US" altLang="zh-CN" dirty="0"/>
+          </a:p>
+          <a:p>
+            <a:pPr algn="r"/>
+            <a:r>
+              <a:rPr lang="en-US" altLang="zh-CN" dirty="0"/>
+              <a:t>A</a:t>
+            </a:r>
+            <a:r>
+              <a:rPr lang="zh-CN" altLang="en-US" dirty="0"/>
+              <a:t> </a:t>
+            </a:r>
+            <a:r>
+              <a:rPr lang="en-US" altLang="zh-CN" dirty="0"/>
+              <a:t>deterministic neural network:</a:t>
+            </a:r>
+          </a:p>
+          <a:p>
+            <a:pPr algn="r"/>
+            <a:endParaRPr lang="en-US" altLang="zh-CN" dirty="0"/>
+          </a:p>
+          <a:p>
+            <a:pPr algn="r"/>
+            <a:r>
+              <a:rPr lang="en-US" altLang="zh-CN" dirty="0"/>
+              <a:t>Obtain of the parameters:</a:t>
+            </a:r>
+          </a:p>
+          <a:p>
+            <a:pPr algn="r"/>
+            <a:endParaRPr lang="en-US" altLang="zh-CN" dirty="0"/>
+          </a:p>
+          <a:p>
+            <a:pPr algn="r"/>
+            <a:endParaRPr lang="en-US" altLang="zh-CN" dirty="0"/>
+          </a:p>
+          <a:p>
+            <a:pPr algn="r"/>
+            <a:r>
+              <a:rPr lang="en-US" altLang="zh-CN" dirty="0"/>
+              <a:t>Bayesian neural network:</a:t>
+            </a:r>
+          </a:p>
+          <a:p>
+            <a:pPr algn="r"/>
+            <a:endParaRPr lang="en-US" altLang="zh-CN" dirty="0"/>
+          </a:p>
+          <a:p>
+            <a:pPr algn="r"/>
+            <a:r>
+              <a:rPr lang="en-US" altLang="zh-CN" dirty="0"/>
+              <a:t>Obtain of the distribution of parameters:</a:t>
+            </a:r>
+          </a:p>
+          <a:p>
+            <a:pPr algn="r"/>
+            <a:endParaRPr lang="en-US" altLang="zh-CN" dirty="0"/>
+          </a:p>
+          <a:p>
+            <a:pPr algn="r"/>
+            <a:r>
+              <a:rPr lang="en-US" altLang="zh-CN" sz="3200" dirty="0"/>
+              <a:t>🤔🤔🤔🤔🤔🤔</a:t>
+            </a:r>
+          </a:p>
+          <a:p>
+            <a:pPr algn="r"/>
+            <a:endParaRPr lang="en-US" altLang="zh-CN" dirty="0"/>
+          </a:p>
+        </p:txBody>
+      </p:sp>
+      <p:pic>
+        <p:nvPicPr>
+          <p:cNvPr id="4" name="Picture 3">
+            <a:extLst>
+              <a:ext uri="{FF2B5EF4-FFF2-40B4-BE49-F238E27FC236}">
+                <a16:creationId xmlns:a16="http://schemas.microsoft.com/office/drawing/2014/main" id="{509CB619-83AE-4147-BA58-5C3ECBBA7747}"/>
+              </a:ext>
+            </a:extLst>
+          </p:cNvPr>
+          <p:cNvPicPr>
+            <a:picLocks noChangeAspect="1"/>
+          </p:cNvPicPr>
+          <p:nvPr/>
+        </p:nvPicPr>
+        <p:blipFill>
+          <a:blip r:embed="rId2"/>
+          <a:stretch>
+            <a:fillRect/>
+          </a:stretch>
+        </p:blipFill>
+        <p:spPr>
+          <a:xfrm>
+            <a:off x="5029200" y="1968430"/>
+            <a:ext cx="1714500" cy="266700"/>
+          </a:xfrm>
+          <a:prstGeom prst="rect">
+            <a:avLst/>
+          </a:prstGeom>
+        </p:spPr>
+      </p:pic>
+      <p:pic>
+        <p:nvPicPr>
+          <p:cNvPr id="5" name="Picture 4">
+            <a:extLst>
+              <a:ext uri="{FF2B5EF4-FFF2-40B4-BE49-F238E27FC236}">
+                <a16:creationId xmlns:a16="http://schemas.microsoft.com/office/drawing/2014/main" id="{7CDDB314-830B-C441-AA16-85F8569C93EC}"/>
+              </a:ext>
+            </a:extLst>
+          </p:cNvPr>
+          <p:cNvPicPr>
+            <a:picLocks noChangeAspect="1"/>
+          </p:cNvPicPr>
+          <p:nvPr/>
+        </p:nvPicPr>
+        <p:blipFill>
+          <a:blip r:embed="rId3"/>
+          <a:stretch>
+            <a:fillRect/>
+          </a:stretch>
+        </p:blipFill>
+        <p:spPr>
+          <a:xfrm>
+            <a:off x="5029200" y="2526467"/>
+            <a:ext cx="1066800" cy="241300"/>
+          </a:xfrm>
+          <a:prstGeom prst="rect">
+            <a:avLst/>
+          </a:prstGeom>
+        </p:spPr>
+      </p:pic>
+      <p:pic>
+        <p:nvPicPr>
+          <p:cNvPr id="11" name="Picture 10">
+            <a:extLst>
+              <a:ext uri="{FF2B5EF4-FFF2-40B4-BE49-F238E27FC236}">
+                <a16:creationId xmlns:a16="http://schemas.microsoft.com/office/drawing/2014/main" id="{0AA97705-1B10-4543-884F-94C424E44030}"/>
+              </a:ext>
+            </a:extLst>
+          </p:cNvPr>
+          <p:cNvPicPr>
+            <a:picLocks noChangeAspect="1"/>
+          </p:cNvPicPr>
+          <p:nvPr/>
+        </p:nvPicPr>
+        <p:blipFill>
+          <a:blip r:embed="rId4"/>
+          <a:stretch>
+            <a:fillRect/>
+          </a:stretch>
+        </p:blipFill>
+        <p:spPr>
+          <a:xfrm>
+            <a:off x="5029200" y="3059104"/>
+            <a:ext cx="2489200" cy="406400"/>
+          </a:xfrm>
+          <a:prstGeom prst="rect">
+            <a:avLst/>
+          </a:prstGeom>
+        </p:spPr>
+      </p:pic>
+      <p:cxnSp>
+        <p:nvCxnSpPr>
+          <p:cNvPr id="13" name="Straight Connector 12">
+            <a:extLst>
+              <a:ext uri="{FF2B5EF4-FFF2-40B4-BE49-F238E27FC236}">
+                <a16:creationId xmlns:a16="http://schemas.microsoft.com/office/drawing/2014/main" id="{134487A5-E1AC-944A-AD92-61155AD0377E}"/>
+              </a:ext>
+            </a:extLst>
+          </p:cNvPr>
+          <p:cNvCxnSpPr>
+            <a:cxnSpLocks/>
+          </p:cNvCxnSpPr>
+          <p:nvPr/>
+        </p:nvCxnSpPr>
+        <p:spPr>
+          <a:xfrm>
+            <a:off x="975360" y="2367280"/>
+            <a:ext cx="10078720" cy="0"/>
+          </a:xfrm>
+          <a:prstGeom prst="line">
+            <a:avLst/>
+          </a:prstGeom>
+        </p:spPr>
+        <p:style>
+          <a:lnRef idx="1">
+            <a:schemeClr val="accent1"/>
+          </a:lnRef>
+          <a:fillRef idx="0">
+            <a:schemeClr val="accent1"/>
+          </a:fillRef>
+          <a:effectRef idx="0">
+            <a:schemeClr val="accent1"/>
+          </a:effectRef>
+          <a:fontRef idx="minor">
+            <a:schemeClr val="tx1"/>
+          </a:fontRef>
+        </p:style>
+      </p:cxnSp>
+      <p:cxnSp>
+        <p:nvCxnSpPr>
+          <p:cNvPr id="15" name="Straight Connector 14">
+            <a:extLst>
+              <a:ext uri="{FF2B5EF4-FFF2-40B4-BE49-F238E27FC236}">
+                <a16:creationId xmlns:a16="http://schemas.microsoft.com/office/drawing/2014/main" id="{3CAAB743-3D6B-964C-9BD9-011BC9FA575D}"/>
+              </a:ext>
+            </a:extLst>
+          </p:cNvPr>
+          <p:cNvCxnSpPr>
+            <a:cxnSpLocks/>
+          </p:cNvCxnSpPr>
+          <p:nvPr/>
+        </p:nvCxnSpPr>
+        <p:spPr>
+          <a:xfrm>
+            <a:off x="975360" y="3586480"/>
+            <a:ext cx="10078720" cy="0"/>
+          </a:xfrm>
+          <a:prstGeom prst="line">
+            <a:avLst/>
+          </a:prstGeom>
+        </p:spPr>
+        <p:style>
+          <a:lnRef idx="1">
+            <a:schemeClr val="accent1"/>
+          </a:lnRef>
+          <a:fillRef idx="0">
+            <a:schemeClr val="accent1"/>
+          </a:fillRef>
+          <a:effectRef idx="0">
+            <a:schemeClr val="accent1"/>
+          </a:effectRef>
+          <a:fontRef idx="minor">
+            <a:schemeClr val="tx1"/>
+          </a:fontRef>
+        </p:style>
+      </p:cxnSp>
+      <p:pic>
+        <p:nvPicPr>
+          <p:cNvPr id="17" name="Picture 16">
+            <a:extLst>
+              <a:ext uri="{FF2B5EF4-FFF2-40B4-BE49-F238E27FC236}">
+                <a16:creationId xmlns:a16="http://schemas.microsoft.com/office/drawing/2014/main" id="{469CC79B-D688-DF4B-A688-A899907E69D9}"/>
+              </a:ext>
+            </a:extLst>
+          </p:cNvPr>
+          <p:cNvPicPr>
+            <a:picLocks noChangeAspect="1"/>
+          </p:cNvPicPr>
+          <p:nvPr/>
+        </p:nvPicPr>
+        <p:blipFill>
+          <a:blip r:embed="rId5"/>
+          <a:stretch>
+            <a:fillRect/>
+          </a:stretch>
+        </p:blipFill>
+        <p:spPr>
+          <a:xfrm>
+            <a:off x="5029200" y="3866316"/>
+            <a:ext cx="1587500" cy="241300"/>
+          </a:xfrm>
+          <a:prstGeom prst="rect">
+            <a:avLst/>
+          </a:prstGeom>
+        </p:spPr>
+      </p:pic>
+      <p:pic>
+        <p:nvPicPr>
+          <p:cNvPr id="18" name="Picture 17">
+            <a:extLst>
+              <a:ext uri="{FF2B5EF4-FFF2-40B4-BE49-F238E27FC236}">
+                <a16:creationId xmlns:a16="http://schemas.microsoft.com/office/drawing/2014/main" id="{DE04A643-020A-A04E-96C1-65851C31CEF0}"/>
+              </a:ext>
+            </a:extLst>
+          </p:cNvPr>
+          <p:cNvPicPr>
+            <a:picLocks noChangeAspect="1"/>
+          </p:cNvPicPr>
+          <p:nvPr/>
+        </p:nvPicPr>
+        <p:blipFill>
+          <a:blip r:embed="rId6"/>
+          <a:stretch>
+            <a:fillRect/>
+          </a:stretch>
+        </p:blipFill>
+        <p:spPr>
+          <a:xfrm>
+            <a:off x="5029200" y="4405194"/>
+            <a:ext cx="723900" cy="241300"/>
           </a:xfrm>
           <a:prstGeom prst="rect">
             <a:avLst/>
@@ -3941,6 +6461,464 @@
     <p:extLst>
       <p:ext uri="{BB962C8B-B14F-4D97-AF65-F5344CB8AC3E}">
         <p14:creationId xmlns:p14="http://schemas.microsoft.com/office/powerpoint/2010/main" val="1742703535"/>
+      </p:ext>
+    </p:extLst>
+  </p:cSld>
+  <p:clrMapOvr>
+    <a:masterClrMapping/>
+  </p:clrMapOvr>
+</p:sld>
+</file>
+
+<file path=ppt/slides/slide8.xml><?xml version="1.0" encoding="utf-8"?>
+<p:sld xmlns:a="http://schemas.openxmlformats.org/drawingml/2006/main" xmlns:r="http://schemas.openxmlformats.org/officeDocument/2006/relationships" xmlns:p="http://schemas.openxmlformats.org/presentationml/2006/main">
+  <p:cSld>
+    <p:spTree>
+      <p:nvGrpSpPr>
+        <p:cNvPr id="1" name=""/>
+        <p:cNvGrpSpPr/>
+        <p:nvPr/>
+      </p:nvGrpSpPr>
+      <p:grpSpPr>
+        <a:xfrm>
+          <a:off x="0" y="0"/>
+          <a:ext cx="0" cy="0"/>
+          <a:chOff x="0" y="0"/>
+          <a:chExt cx="0" cy="0"/>
+        </a:xfrm>
+      </p:grpSpPr>
+      <p:sp>
+        <p:nvSpPr>
+          <p:cNvPr id="2" name="Title 1">
+            <a:extLst>
+              <a:ext uri="{FF2B5EF4-FFF2-40B4-BE49-F238E27FC236}">
+                <a16:creationId xmlns:a16="http://schemas.microsoft.com/office/drawing/2014/main" id="{F7A54BA8-26EB-6940-819C-06A2549B85C2}"/>
+              </a:ext>
+            </a:extLst>
+          </p:cNvPr>
+          <p:cNvSpPr>
+            <a:spLocks noGrp="1"/>
+          </p:cNvSpPr>
+          <p:nvPr>
+            <p:ph type="title"/>
+          </p:nvPr>
+        </p:nvSpPr>
+        <p:spPr/>
+        <p:txBody>
+          <a:bodyPr/>
+          <a:lstStyle/>
+          <a:p>
+            <a:r>
+              <a:rPr lang="en-US" dirty="0"/>
+              <a:t>Bayesian Surrogate neural network </a:t>
+            </a:r>
+          </a:p>
+        </p:txBody>
+      </p:sp>
+      <p:sp>
+        <p:nvSpPr>
+          <p:cNvPr id="3" name="Content Placeholder 2">
+            <a:extLst>
+              <a:ext uri="{FF2B5EF4-FFF2-40B4-BE49-F238E27FC236}">
+                <a16:creationId xmlns:a16="http://schemas.microsoft.com/office/drawing/2014/main" id="{5B859D23-C8EA-794A-9DB0-32D80CC4FBC1}"/>
+              </a:ext>
+            </a:extLst>
+          </p:cNvPr>
+          <p:cNvSpPr>
+            <a:spLocks noGrp="1"/>
+          </p:cNvSpPr>
+          <p:nvPr>
+            <p:ph idx="1"/>
+          </p:nvPr>
+        </p:nvSpPr>
+        <p:spPr/>
+        <p:txBody>
+          <a:bodyPr/>
+          <a:lstStyle/>
+          <a:p>
+            <a:r>
+              <a:rPr lang="en-US" dirty="0"/>
+              <a:t>Only if an ensemble of samples could be obtained</a:t>
+            </a:r>
+          </a:p>
+          <a:p>
+            <a:r>
+              <a:rPr lang="en-US" dirty="0"/>
+              <a:t>Bayesian Inference:</a:t>
+            </a:r>
+          </a:p>
+          <a:p>
+            <a:endParaRPr lang="en-US" dirty="0"/>
+          </a:p>
+        </p:txBody>
+      </p:sp>
+      <p:sp>
+        <p:nvSpPr>
+          <p:cNvPr id="4" name="Title 1">
+            <a:extLst>
+              <a:ext uri="{FF2B5EF4-FFF2-40B4-BE49-F238E27FC236}">
+                <a16:creationId xmlns:a16="http://schemas.microsoft.com/office/drawing/2014/main" id="{F2247A84-2F61-2848-80A9-895E3585D87B}"/>
+              </a:ext>
+            </a:extLst>
+          </p:cNvPr>
+          <p:cNvSpPr txBox="1">
+            <a:spLocks/>
+          </p:cNvSpPr>
+          <p:nvPr/>
+        </p:nvSpPr>
+        <p:spPr>
+          <a:xfrm>
+            <a:off x="990600" y="517525"/>
+            <a:ext cx="10515600" cy="1325563"/>
+          </a:xfrm>
+          <a:prstGeom prst="rect">
+            <a:avLst/>
+          </a:prstGeom>
+        </p:spPr>
+        <p:txBody>
+          <a:bodyPr vert="horz" lIns="91440" tIns="45720" rIns="91440" bIns="45720" rtlCol="0" anchor="ctr">
+            <a:normAutofit/>
+          </a:bodyPr>
+          <a:lstStyle>
+            <a:lvl1pPr algn="l" defTabSz="914400" rtl="0" eaLnBrk="1" latinLnBrk="0" hangingPunct="1">
+              <a:lnSpc>
+                <a:spcPct val="90000"/>
+              </a:lnSpc>
+              <a:spcBef>
+                <a:spcPct val="0"/>
+              </a:spcBef>
+              <a:buNone/>
+              <a:defRPr sz="4400" kern="1200">
+                <a:solidFill>
+                  <a:schemeClr val="tx1"/>
+                </a:solidFill>
+                <a:latin typeface="+mj-lt"/>
+                <a:ea typeface="+mj-ea"/>
+                <a:cs typeface="+mj-cs"/>
+              </a:defRPr>
+            </a:lvl1pPr>
+          </a:lstStyle>
+          <a:p>
+            <a:endParaRPr lang="en-US" dirty="0"/>
+          </a:p>
+        </p:txBody>
+      </p:sp>
+      <p:sp>
+        <p:nvSpPr>
+          <p:cNvPr id="7" name="Rounded Rectangle 6">
+            <a:extLst>
+              <a:ext uri="{FF2B5EF4-FFF2-40B4-BE49-F238E27FC236}">
+                <a16:creationId xmlns:a16="http://schemas.microsoft.com/office/drawing/2014/main" id="{B6DFC7BA-FE7B-4947-A5AE-B64EFD4DBF30}"/>
+              </a:ext>
+            </a:extLst>
+          </p:cNvPr>
+          <p:cNvSpPr/>
+          <p:nvPr/>
+        </p:nvSpPr>
+        <p:spPr>
+          <a:xfrm>
+            <a:off x="8331200" y="2885440"/>
+            <a:ext cx="772160" cy="264160"/>
+          </a:xfrm>
+          <a:prstGeom prst="roundRect">
+            <a:avLst/>
+          </a:prstGeom>
+          <a:noFill/>
+          <a:ln>
+            <a:solidFill>
+              <a:schemeClr val="accent5"/>
+            </a:solidFill>
+          </a:ln>
+        </p:spPr>
+        <p:style>
+          <a:lnRef idx="2">
+            <a:schemeClr val="accent6"/>
+          </a:lnRef>
+          <a:fillRef idx="1">
+            <a:schemeClr val="lt1"/>
+          </a:fillRef>
+          <a:effectRef idx="0">
+            <a:schemeClr val="accent6"/>
+          </a:effectRef>
+          <a:fontRef idx="minor">
+            <a:schemeClr val="dk1"/>
+          </a:fontRef>
+        </p:style>
+        <p:txBody>
+          <a:bodyPr rtlCol="0" anchor="ctr"/>
+          <a:lstStyle/>
+          <a:p>
+            <a:pPr algn="ctr"/>
+            <a:endParaRPr lang="en-US"/>
+          </a:p>
+        </p:txBody>
+      </p:sp>
+      <p:sp>
+        <p:nvSpPr>
+          <p:cNvPr id="8" name="TextBox 7">
+            <a:extLst>
+              <a:ext uri="{FF2B5EF4-FFF2-40B4-BE49-F238E27FC236}">
+                <a16:creationId xmlns:a16="http://schemas.microsoft.com/office/drawing/2014/main" id="{04C91B9D-3B81-A948-8B9D-27DA7A1409EF}"/>
+              </a:ext>
+            </a:extLst>
+          </p:cNvPr>
+          <p:cNvSpPr txBox="1"/>
+          <p:nvPr/>
+        </p:nvSpPr>
+        <p:spPr>
+          <a:xfrm>
+            <a:off x="7426960" y="3386137"/>
+            <a:ext cx="2873864" cy="369332"/>
+          </a:xfrm>
+          <a:prstGeom prst="rect">
+            <a:avLst/>
+          </a:prstGeom>
+          <a:noFill/>
+        </p:spPr>
+        <p:txBody>
+          <a:bodyPr wrap="none" rtlCol="0">
+            <a:spAutoFit/>
+          </a:bodyPr>
+          <a:lstStyle/>
+          <a:p>
+            <a:r>
+              <a:rPr lang="en-US" dirty="0"/>
+              <a:t>Unnormalized posterior of w</a:t>
+            </a:r>
+          </a:p>
+        </p:txBody>
+      </p:sp>
+      <p:cxnSp>
+        <p:nvCxnSpPr>
+          <p:cNvPr id="10" name="Straight Arrow Connector 9">
+            <a:extLst>
+              <a:ext uri="{FF2B5EF4-FFF2-40B4-BE49-F238E27FC236}">
+                <a16:creationId xmlns:a16="http://schemas.microsoft.com/office/drawing/2014/main" id="{6D750C56-D65E-F141-A8CF-34D76469587F}"/>
+              </a:ext>
+            </a:extLst>
+          </p:cNvPr>
+          <p:cNvCxnSpPr>
+            <a:stCxn id="7" idx="2"/>
+            <a:endCxn id="8" idx="0"/>
+          </p:cNvCxnSpPr>
+          <p:nvPr/>
+        </p:nvCxnSpPr>
+        <p:spPr>
+          <a:xfrm>
+            <a:off x="8717280" y="3149600"/>
+            <a:ext cx="146612" cy="236537"/>
+          </a:xfrm>
+          <a:prstGeom prst="straightConnector1">
+            <a:avLst/>
+          </a:prstGeom>
+          <a:ln>
+            <a:tailEnd type="triangle"/>
+          </a:ln>
+        </p:spPr>
+        <p:style>
+          <a:lnRef idx="1">
+            <a:schemeClr val="accent1"/>
+          </a:lnRef>
+          <a:fillRef idx="0">
+            <a:schemeClr val="accent1"/>
+          </a:fillRef>
+          <a:effectRef idx="0">
+            <a:schemeClr val="accent1"/>
+          </a:effectRef>
+          <a:fontRef idx="minor">
+            <a:schemeClr val="tx1"/>
+          </a:fontRef>
+        </p:style>
+      </p:cxnSp>
+      <p:pic>
+        <p:nvPicPr>
+          <p:cNvPr id="12" name="Picture 11" descr="A picture containing table&#10;&#10;Description automatically generated">
+            <a:extLst>
+              <a:ext uri="{FF2B5EF4-FFF2-40B4-BE49-F238E27FC236}">
+                <a16:creationId xmlns:a16="http://schemas.microsoft.com/office/drawing/2014/main" id="{7A05866B-ACCF-9142-8182-D387B047AD7A}"/>
+              </a:ext>
+            </a:extLst>
+          </p:cNvPr>
+          <p:cNvPicPr>
+            <a:picLocks noChangeAspect="1"/>
+          </p:cNvPicPr>
+          <p:nvPr/>
+        </p:nvPicPr>
+        <p:blipFill>
+          <a:blip r:embed="rId2"/>
+          <a:stretch>
+            <a:fillRect/>
+          </a:stretch>
+        </p:blipFill>
+        <p:spPr>
+          <a:xfrm>
+            <a:off x="1372870" y="3779836"/>
+            <a:ext cx="7861300" cy="2298700"/>
+          </a:xfrm>
+          <a:prstGeom prst="rect">
+            <a:avLst/>
+          </a:prstGeom>
+        </p:spPr>
+      </p:pic>
+      <p:pic>
+        <p:nvPicPr>
+          <p:cNvPr id="13" name="Picture 12">
+            <a:extLst>
+              <a:ext uri="{FF2B5EF4-FFF2-40B4-BE49-F238E27FC236}">
+                <a16:creationId xmlns:a16="http://schemas.microsoft.com/office/drawing/2014/main" id="{5158F65A-B21C-DA41-ABB9-53FEE2E92BE3}"/>
+              </a:ext>
+            </a:extLst>
+          </p:cNvPr>
+          <p:cNvPicPr>
+            <a:picLocks noChangeAspect="1"/>
+          </p:cNvPicPr>
+          <p:nvPr/>
+        </p:nvPicPr>
+        <p:blipFill>
+          <a:blip r:embed="rId3"/>
+          <a:stretch>
+            <a:fillRect/>
+          </a:stretch>
+        </p:blipFill>
+        <p:spPr>
+          <a:xfrm>
+            <a:off x="2138680" y="2914809"/>
+            <a:ext cx="7772400" cy="393700"/>
+          </a:xfrm>
+          <a:prstGeom prst="rect">
+            <a:avLst/>
+          </a:prstGeom>
+        </p:spPr>
+      </p:pic>
+    </p:spTree>
+    <p:extLst>
+      <p:ext uri="{BB962C8B-B14F-4D97-AF65-F5344CB8AC3E}">
+        <p14:creationId xmlns:p14="http://schemas.microsoft.com/office/powerpoint/2010/main" val="1490960171"/>
+      </p:ext>
+    </p:extLst>
+  </p:cSld>
+  <p:clrMapOvr>
+    <a:masterClrMapping/>
+  </p:clrMapOvr>
+</p:sld>
+</file>
+
+<file path=ppt/slides/slide9.xml><?xml version="1.0" encoding="utf-8"?>
+<p:sld xmlns:a="http://schemas.openxmlformats.org/drawingml/2006/main" xmlns:r="http://schemas.openxmlformats.org/officeDocument/2006/relationships" xmlns:p="http://schemas.openxmlformats.org/presentationml/2006/main">
+  <p:cSld>
+    <p:spTree>
+      <p:nvGrpSpPr>
+        <p:cNvPr id="1" name=""/>
+        <p:cNvGrpSpPr/>
+        <p:nvPr/>
+      </p:nvGrpSpPr>
+      <p:grpSpPr>
+        <a:xfrm>
+          <a:off x="0" y="0"/>
+          <a:ext cx="0" cy="0"/>
+          <a:chOff x="0" y="0"/>
+          <a:chExt cx="0" cy="0"/>
+        </a:xfrm>
+      </p:grpSpPr>
+      <p:sp>
+        <p:nvSpPr>
+          <p:cNvPr id="2" name="Title 1">
+            <a:extLst>
+              <a:ext uri="{FF2B5EF4-FFF2-40B4-BE49-F238E27FC236}">
+                <a16:creationId xmlns:a16="http://schemas.microsoft.com/office/drawing/2014/main" id="{9B28046E-E2FE-8440-A5D7-7F88DAD2D4C3}"/>
+              </a:ext>
+            </a:extLst>
+          </p:cNvPr>
+          <p:cNvSpPr>
+            <a:spLocks noGrp="1"/>
+          </p:cNvSpPr>
+          <p:nvPr>
+            <p:ph type="title"/>
+          </p:nvPr>
+        </p:nvSpPr>
+        <p:spPr/>
+        <p:txBody>
+          <a:bodyPr/>
+          <a:lstStyle/>
+          <a:p>
+            <a:r>
+              <a:rPr lang="en-US" dirty="0"/>
+              <a:t>Bayesian Surrogate neural network </a:t>
+            </a:r>
+          </a:p>
+        </p:txBody>
+      </p:sp>
+      <p:sp>
+        <p:nvSpPr>
+          <p:cNvPr id="3" name="Content Placeholder 2">
+            <a:extLst>
+              <a:ext uri="{FF2B5EF4-FFF2-40B4-BE49-F238E27FC236}">
+                <a16:creationId xmlns:a16="http://schemas.microsoft.com/office/drawing/2014/main" id="{798ABCC4-E26E-0647-962E-2363F5CEE75D}"/>
+              </a:ext>
+            </a:extLst>
+          </p:cNvPr>
+          <p:cNvSpPr>
+            <a:spLocks noGrp="1"/>
+          </p:cNvSpPr>
+          <p:nvPr>
+            <p:ph idx="1"/>
+          </p:nvPr>
+        </p:nvSpPr>
+        <p:spPr/>
+        <p:txBody>
+          <a:bodyPr/>
+          <a:lstStyle/>
+          <a:p>
+            <a:r>
+              <a:rPr lang="en-US" dirty="0"/>
+              <a:t>With ~20 samples obtained for the parameters:</a:t>
+            </a:r>
+          </a:p>
+          <a:p>
+            <a:pPr marL="457200" lvl="1" indent="0">
+              <a:buNone/>
+            </a:pPr>
+            <a:r>
+              <a:rPr lang="en-US" dirty="0"/>
+              <a:t> </a:t>
+            </a:r>
+          </a:p>
+        </p:txBody>
+      </p:sp>
+      <p:pic>
+        <p:nvPicPr>
+          <p:cNvPr id="4" name="Picture 3">
+            <a:extLst>
+              <a:ext uri="{FF2B5EF4-FFF2-40B4-BE49-F238E27FC236}">
+                <a16:creationId xmlns:a16="http://schemas.microsoft.com/office/drawing/2014/main" id="{853C696C-1D1E-2A4A-9264-7BCCEBEB622D}"/>
+              </a:ext>
+            </a:extLst>
+          </p:cNvPr>
+          <p:cNvPicPr>
+            <a:picLocks noChangeAspect="1"/>
+          </p:cNvPicPr>
+          <p:nvPr/>
+        </p:nvPicPr>
+        <p:blipFill>
+          <a:blip r:embed="rId2"/>
+          <a:stretch>
+            <a:fillRect/>
+          </a:stretch>
+        </p:blipFill>
+        <p:spPr>
+          <a:xfrm>
+            <a:off x="4588510" y="2303780"/>
+            <a:ext cx="2527300" cy="685800"/>
+          </a:xfrm>
+          <a:prstGeom prst="rect">
+            <a:avLst/>
+          </a:prstGeom>
+        </p:spPr>
+      </p:pic>
+    </p:spTree>
+    <p:extLst>
+      <p:ext uri="{BB962C8B-B14F-4D97-AF65-F5344CB8AC3E}">
+        <p14:creationId xmlns:p14="http://schemas.microsoft.com/office/powerpoint/2010/main" val="3503618459"/>
       </p:ext>
     </p:extLst>
   </p:cSld>
@@ -4243,4 +7221,299 @@
     </a:ext>
   </a:extLst>
 </a:theme>
+</file>
+
+<file path=ppt/theme/theme2.xml><?xml version="1.0" encoding="utf-8"?>
+<a:theme xmlns:a="http://schemas.openxmlformats.org/drawingml/2006/main" name="Office Theme">
+  <a:themeElements>
+    <a:clrScheme name="Office">
+      <a:dk1>
+        <a:sysClr val="windowText" lastClr="000000"/>
+      </a:dk1>
+      <a:lt1>
+        <a:sysClr val="window" lastClr="FFFFFF"/>
+      </a:lt1>
+      <a:dk2>
+        <a:srgbClr val="44546A"/>
+      </a:dk2>
+      <a:lt2>
+        <a:srgbClr val="E7E6E6"/>
+      </a:lt2>
+      <a:accent1>
+        <a:srgbClr val="4472C4"/>
+      </a:accent1>
+      <a:accent2>
+        <a:srgbClr val="ED7D31"/>
+      </a:accent2>
+      <a:accent3>
+        <a:srgbClr val="A5A5A5"/>
+      </a:accent3>
+      <a:accent4>
+        <a:srgbClr val="FFC000"/>
+      </a:accent4>
+      <a:accent5>
+        <a:srgbClr val="5B9BD5"/>
+      </a:accent5>
+      <a:accent6>
+        <a:srgbClr val="70AD47"/>
+      </a:accent6>
+      <a:hlink>
+        <a:srgbClr val="0563C1"/>
+      </a:hlink>
+      <a:folHlink>
+        <a:srgbClr val="954F72"/>
+      </a:folHlink>
+    </a:clrScheme>
+    <a:fontScheme name="Office">
+      <a:majorFont>
+        <a:latin typeface="Calibri Light" panose="020F0302020204030204"/>
+        <a:ea typeface=""/>
+        <a:cs typeface=""/>
+        <a:font script="Jpan" typeface="游ゴシック Light"/>
+        <a:font script="Hang" typeface="맑은 고딕"/>
+        <a:font script="Hans" typeface="等线 Light"/>
+        <a:font script="Hant" typeface="新細明體"/>
+        <a:font script="Arab" typeface="Times New Roman"/>
+        <a:font script="Hebr" typeface="Times New Roman"/>
+        <a:font script="Thai" typeface="Angsana New"/>
+        <a:font script="Ethi" typeface="Nyala"/>
+        <a:font script="Beng" typeface="Vrinda"/>
+        <a:font script="Gujr" typeface="Shruti"/>
+        <a:font script="Khmr" typeface="MoolBoran"/>
+        <a:font script="Knda" typeface="Tunga"/>
+        <a:font script="Guru" typeface="Raavi"/>
+        <a:font script="Cans" typeface="Euphemia"/>
+        <a:font script="Cher" typeface="Plantagenet Cherokee"/>
+        <a:font script="Yiii" typeface="Microsoft Yi Baiti"/>
+        <a:font script="Tibt" typeface="Microsoft Himalaya"/>
+        <a:font script="Thaa" typeface="MV Boli"/>
+        <a:font script="Deva" typeface="Mangal"/>
+        <a:font script="Telu" typeface="Gautami"/>
+        <a:font script="Taml" typeface="Latha"/>
+        <a:font script="Syrc" typeface="Estrangelo Edessa"/>
+        <a:font script="Orya" typeface="Kalinga"/>
+        <a:font script="Mlym" typeface="Kartika"/>
+        <a:font script="Laoo" typeface="DokChampa"/>
+        <a:font script="Sinh" typeface="Iskoola Pota"/>
+        <a:font script="Mong" typeface="Mongolian Baiti"/>
+        <a:font script="Viet" typeface="Times New Roman"/>
+        <a:font script="Uigh" typeface="Microsoft Uighur"/>
+        <a:font script="Geor" typeface="Sylfaen"/>
+        <a:font script="Armn" typeface="Arial"/>
+        <a:font script="Bugi" typeface="Leelawadee UI"/>
+        <a:font script="Bopo" typeface="Microsoft JhengHei"/>
+        <a:font script="Java" typeface="Javanese Text"/>
+        <a:font script="Lisu" typeface="Segoe UI"/>
+        <a:font script="Mymr" typeface="Myanmar Text"/>
+        <a:font script="Nkoo" typeface="Ebrima"/>
+        <a:font script="Olck" typeface="Nirmala UI"/>
+        <a:font script="Osma" typeface="Ebrima"/>
+        <a:font script="Phag" typeface="Phagspa"/>
+        <a:font script="Syrn" typeface="Estrangelo Edessa"/>
+        <a:font script="Syrj" typeface="Estrangelo Edessa"/>
+        <a:font script="Syre" typeface="Estrangelo Edessa"/>
+        <a:font script="Sora" typeface="Nirmala UI"/>
+        <a:font script="Tale" typeface="Microsoft Tai Le"/>
+        <a:font script="Talu" typeface="Microsoft New Tai Lue"/>
+        <a:font script="Tfng" typeface="Ebrima"/>
+      </a:majorFont>
+      <a:minorFont>
+        <a:latin typeface="Calibri" panose="020F0502020204030204"/>
+        <a:ea typeface=""/>
+        <a:cs typeface=""/>
+        <a:font script="Jpan" typeface="游ゴシック"/>
+        <a:font script="Hang" typeface="맑은 고딕"/>
+        <a:font script="Hans" typeface="等线"/>
+        <a:font script="Hant" typeface="新細明體"/>
+        <a:font script="Arab" typeface="Arial"/>
+        <a:font script="Hebr" typeface="Arial"/>
+        <a:font script="Thai" typeface="Cordia New"/>
+        <a:font script="Ethi" typeface="Nyala"/>
+        <a:font script="Beng" typeface="Vrinda"/>
+        <a:font script="Gujr" typeface="Shruti"/>
+        <a:font script="Khmr" typeface="DaunPenh"/>
+        <a:font script="Knda" typeface="Tunga"/>
+        <a:font script="Guru" typeface="Raavi"/>
+        <a:font script="Cans" typeface="Euphemia"/>
+        <a:font script="Cher" typeface="Plantagenet Cherokee"/>
+        <a:font script="Yiii" typeface="Microsoft Yi Baiti"/>
+        <a:font script="Tibt" typeface="Microsoft Himalaya"/>
+        <a:font script="Thaa" typeface="MV Boli"/>
+        <a:font script="Deva" typeface="Mangal"/>
+        <a:font script="Telu" typeface="Gautami"/>
+        <a:font script="Taml" typeface="Latha"/>
+        <a:font script="Syrc" typeface="Estrangelo Edessa"/>
+        <a:font script="Orya" typeface="Kalinga"/>
+        <a:font script="Mlym" typeface="Kartika"/>
+        <a:font script="Laoo" typeface="DokChampa"/>
+        <a:font script="Sinh" typeface="Iskoola Pota"/>
+        <a:font script="Mong" typeface="Mongolian Baiti"/>
+        <a:font script="Viet" typeface="Arial"/>
+        <a:font script="Uigh" typeface="Microsoft Uighur"/>
+        <a:font script="Geor" typeface="Sylfaen"/>
+        <a:font script="Armn" typeface="Arial"/>
+        <a:font script="Bugi" typeface="Leelawadee UI"/>
+        <a:font script="Bopo" typeface="Microsoft JhengHei"/>
+        <a:font script="Java" typeface="Javanese Text"/>
+        <a:font script="Lisu" typeface="Segoe UI"/>
+        <a:font script="Mymr" typeface="Myanmar Text"/>
+        <a:font script="Nkoo" typeface="Ebrima"/>
+        <a:font script="Olck" typeface="Nirmala UI"/>
+        <a:font script="Osma" typeface="Ebrima"/>
+        <a:font script="Phag" typeface="Phagspa"/>
+        <a:font script="Syrn" typeface="Estrangelo Edessa"/>
+        <a:font script="Syrj" typeface="Estrangelo Edessa"/>
+        <a:font script="Syre" typeface="Estrangelo Edessa"/>
+        <a:font script="Sora" typeface="Nirmala UI"/>
+        <a:font script="Tale" typeface="Microsoft Tai Le"/>
+        <a:font script="Talu" typeface="Microsoft New Tai Lue"/>
+        <a:font script="Tfng" typeface="Ebrima"/>
+      </a:minorFont>
+    </a:fontScheme>
+    <a:fmtScheme name="Office">
+      <a:fillStyleLst>
+        <a:solidFill>
+          <a:schemeClr val="phClr"/>
+        </a:solidFill>
+        <a:gradFill rotWithShape="1">
+          <a:gsLst>
+            <a:gs pos="0">
+              <a:schemeClr val="phClr">
+                <a:lumMod val="110000"/>
+                <a:satMod val="105000"/>
+                <a:tint val="67000"/>
+              </a:schemeClr>
+            </a:gs>
+            <a:gs pos="50000">
+              <a:schemeClr val="phClr">
+                <a:lumMod val="105000"/>
+                <a:satMod val="103000"/>
+                <a:tint val="73000"/>
+              </a:schemeClr>
+            </a:gs>
+            <a:gs pos="100000">
+              <a:schemeClr val="phClr">
+                <a:lumMod val="105000"/>
+                <a:satMod val="109000"/>
+                <a:tint val="81000"/>
+              </a:schemeClr>
+            </a:gs>
+          </a:gsLst>
+          <a:lin ang="5400000" scaled="0"/>
+        </a:gradFill>
+        <a:gradFill rotWithShape="1">
+          <a:gsLst>
+            <a:gs pos="0">
+              <a:schemeClr val="phClr">
+                <a:satMod val="103000"/>
+                <a:lumMod val="102000"/>
+                <a:tint val="94000"/>
+              </a:schemeClr>
+            </a:gs>
+            <a:gs pos="50000">
+              <a:schemeClr val="phClr">
+                <a:satMod val="110000"/>
+                <a:lumMod val="100000"/>
+                <a:shade val="100000"/>
+              </a:schemeClr>
+            </a:gs>
+            <a:gs pos="100000">
+              <a:schemeClr val="phClr">
+                <a:lumMod val="99000"/>
+                <a:satMod val="120000"/>
+                <a:shade val="78000"/>
+              </a:schemeClr>
+            </a:gs>
+          </a:gsLst>
+          <a:lin ang="5400000" scaled="0"/>
+        </a:gradFill>
+      </a:fillStyleLst>
+      <a:lnStyleLst>
+        <a:ln w="6350" cap="flat" cmpd="sng" algn="ctr">
+          <a:solidFill>
+            <a:schemeClr val="phClr"/>
+          </a:solidFill>
+          <a:prstDash val="solid"/>
+          <a:miter lim="800000"/>
+        </a:ln>
+        <a:ln w="12700" cap="flat" cmpd="sng" algn="ctr">
+          <a:solidFill>
+            <a:schemeClr val="phClr"/>
+          </a:solidFill>
+          <a:prstDash val="solid"/>
+          <a:miter lim="800000"/>
+        </a:ln>
+        <a:ln w="19050" cap="flat" cmpd="sng" algn="ctr">
+          <a:solidFill>
+            <a:schemeClr val="phClr"/>
+          </a:solidFill>
+          <a:prstDash val="solid"/>
+          <a:miter lim="800000"/>
+        </a:ln>
+      </a:lnStyleLst>
+      <a:effectStyleLst>
+        <a:effectStyle>
+          <a:effectLst/>
+        </a:effectStyle>
+        <a:effectStyle>
+          <a:effectLst/>
+        </a:effectStyle>
+        <a:effectStyle>
+          <a:effectLst>
+            <a:outerShdw blurRad="57150" dist="19050" dir="5400000" algn="ctr" rotWithShape="0">
+              <a:srgbClr val="000000">
+                <a:alpha val="63000"/>
+              </a:srgbClr>
+            </a:outerShdw>
+          </a:effectLst>
+        </a:effectStyle>
+      </a:effectStyleLst>
+      <a:bgFillStyleLst>
+        <a:solidFill>
+          <a:schemeClr val="phClr"/>
+        </a:solidFill>
+        <a:solidFill>
+          <a:schemeClr val="phClr">
+            <a:tint val="95000"/>
+            <a:satMod val="170000"/>
+          </a:schemeClr>
+        </a:solidFill>
+        <a:gradFill rotWithShape="1">
+          <a:gsLst>
+            <a:gs pos="0">
+              <a:schemeClr val="phClr">
+                <a:tint val="93000"/>
+                <a:satMod val="150000"/>
+                <a:shade val="98000"/>
+                <a:lumMod val="102000"/>
+              </a:schemeClr>
+            </a:gs>
+            <a:gs pos="50000">
+              <a:schemeClr val="phClr">
+                <a:tint val="98000"/>
+                <a:satMod val="130000"/>
+                <a:shade val="90000"/>
+                <a:lumMod val="103000"/>
+              </a:schemeClr>
+            </a:gs>
+            <a:gs pos="100000">
+              <a:schemeClr val="phClr">
+                <a:shade val="63000"/>
+                <a:satMod val="120000"/>
+              </a:schemeClr>
+            </a:gs>
+          </a:gsLst>
+          <a:lin ang="5400000" scaled="0"/>
+        </a:gradFill>
+      </a:bgFillStyleLst>
+    </a:fmtScheme>
+  </a:themeElements>
+  <a:objectDefaults/>
+  <a:extraClrSchemeLst/>
+  <a:extLst>
+    <a:ext uri="{05A4C25C-085E-4340-85A3-A5531E510DB2}">
+      <thm15:themeFamily xmlns:thm15="http://schemas.microsoft.com/office/thememl/2012/main" name="Office Theme" id="{62F939B6-93AF-4DB8-9C6B-D6C7DFDC589F}" vid="{4A3C46E8-61CC-4603-A589-7422A47A8E4A}"/>
+    </a:ext>
+  </a:extLst>
+</a:theme>
 </file>
</xml_diff>

<commit_message>
updated some plots, changed the release(-1) to be in 4th layer again,
</commit_message>
<xml_diff>
--- a/bayesian.pptx
+++ b/bayesian.pptx
@@ -208,7 +208,7 @@
           <a:p>
             <a:fld id="{1B55C052-9DFF-0540-A4A0-56E775174C83}" type="datetimeFigureOut">
               <a:rPr lang="en-US" smtClean="0"/>
-              <a:t>3/6/21</a:t>
+              <a:t>3/15/21</a:t>
             </a:fld>
             <a:endParaRPr lang="en-US"/>
           </a:p>
@@ -790,7 +790,7 @@
           <a:p>
             <a:fld id="{6E340711-0012-B943-8AA8-2B4B22CD282D}" type="datetime1">
               <a:rPr lang="en-US" smtClean="0"/>
-              <a:t>3/6/21</a:t>
+              <a:t>3/15/21</a:t>
             </a:fld>
             <a:endParaRPr lang="en-US"/>
           </a:p>
@@ -988,7 +988,7 @@
           <a:p>
             <a:fld id="{40DD5BF0-55EF-CF48-A51A-0E10A5E9C4FB}" type="datetime1">
               <a:rPr lang="en-US" smtClean="0"/>
-              <a:t>3/6/21</a:t>
+              <a:t>3/15/21</a:t>
             </a:fld>
             <a:endParaRPr lang="en-US"/>
           </a:p>
@@ -1196,7 +1196,7 @@
           <a:p>
             <a:fld id="{158A26FE-C312-AD49-83E1-1A56699B4C75}" type="datetime1">
               <a:rPr lang="en-US" smtClean="0"/>
-              <a:t>3/6/21</a:t>
+              <a:t>3/15/21</a:t>
             </a:fld>
             <a:endParaRPr lang="en-US"/>
           </a:p>
@@ -1394,7 +1394,7 @@
           <a:p>
             <a:fld id="{19A615F8-3224-C54D-BA27-7BCE5EEED14A}" type="datetime1">
               <a:rPr lang="en-US" smtClean="0"/>
-              <a:t>3/6/21</a:t>
+              <a:t>3/15/21</a:t>
             </a:fld>
             <a:endParaRPr lang="en-US"/>
           </a:p>
@@ -1669,7 +1669,7 @@
           <a:p>
             <a:fld id="{A4F48A56-ADC2-304A-A686-BFB38470E229}" type="datetime1">
               <a:rPr lang="en-US" smtClean="0"/>
-              <a:t>3/6/21</a:t>
+              <a:t>3/15/21</a:t>
             </a:fld>
             <a:endParaRPr lang="en-US"/>
           </a:p>
@@ -1934,7 +1934,7 @@
           <a:p>
             <a:fld id="{E4F6836E-3EF4-2D48-A5B3-4522848E7CF7}" type="datetime1">
               <a:rPr lang="en-US" smtClean="0"/>
-              <a:t>3/6/21</a:t>
+              <a:t>3/15/21</a:t>
             </a:fld>
             <a:endParaRPr lang="en-US"/>
           </a:p>
@@ -2346,7 +2346,7 @@
           <a:p>
             <a:fld id="{E75C92BF-2187-1E4D-A0B9-FC492E92B411}" type="datetime1">
               <a:rPr lang="en-US" smtClean="0"/>
-              <a:t>3/6/21</a:t>
+              <a:t>3/15/21</a:t>
             </a:fld>
             <a:endParaRPr lang="en-US"/>
           </a:p>
@@ -2487,7 +2487,7 @@
           <a:p>
             <a:fld id="{92B39508-B16C-F941-B337-5FE3C9220546}" type="datetime1">
               <a:rPr lang="en-US" smtClean="0"/>
-              <a:t>3/6/21</a:t>
+              <a:t>3/15/21</a:t>
             </a:fld>
             <a:endParaRPr lang="en-US"/>
           </a:p>
@@ -2600,7 +2600,7 @@
           <a:p>
             <a:fld id="{3CD32A7D-D121-BF4F-8397-9ED880F24538}" type="datetime1">
               <a:rPr lang="en-US" smtClean="0"/>
-              <a:t>3/6/21</a:t>
+              <a:t>3/15/21</a:t>
             </a:fld>
             <a:endParaRPr lang="en-US"/>
           </a:p>
@@ -2911,7 +2911,7 @@
           <a:p>
             <a:fld id="{5493B5AC-E223-6C4C-BF9D-A90772A912E9}" type="datetime1">
               <a:rPr lang="en-US" smtClean="0"/>
-              <a:t>3/6/21</a:t>
+              <a:t>3/15/21</a:t>
             </a:fld>
             <a:endParaRPr lang="en-US"/>
           </a:p>
@@ -3199,7 +3199,7 @@
           <a:p>
             <a:fld id="{E96FAC7D-AC5B-974E-84FE-2647076D7590}" type="datetime1">
               <a:rPr lang="en-US" smtClean="0"/>
-              <a:t>3/6/21</a:t>
+              <a:t>3/15/21</a:t>
             </a:fld>
             <a:endParaRPr lang="en-US"/>
           </a:p>
@@ -3440,7 +3440,7 @@
           <a:p>
             <a:fld id="{891FB6C2-03DB-584E-8955-6C836EF0F673}" type="datetime1">
               <a:rPr lang="en-US" smtClean="0"/>
-              <a:t>3/6/21</a:t>
+              <a:t>3/15/21</a:t>
             </a:fld>
             <a:endParaRPr lang="en-US"/>
           </a:p>
@@ -5160,7 +5160,7 @@
           <a:p>
             <a:r>
               <a:rPr lang="en-US" dirty="0"/>
-              <a:t>Source term: release from 1 of the injecting wells</a:t>
+              <a:t>Source term: release from 1 of the wells</a:t>
             </a:r>
           </a:p>
           <a:p>
@@ -5183,12 +5183,47 @@
           </a:p>
         </p:txBody>
       </p:sp>
+      <p:sp>
+        <p:nvSpPr>
+          <p:cNvPr id="5" name="TextBox 4">
+            <a:extLst>
+              <a:ext uri="{FF2B5EF4-FFF2-40B4-BE49-F238E27FC236}">
+                <a16:creationId xmlns:a16="http://schemas.microsoft.com/office/drawing/2014/main" id="{390C528B-4F19-4643-B8C3-211674819DD6}"/>
+              </a:ext>
+            </a:extLst>
+          </p:cNvPr>
+          <p:cNvSpPr txBox="1"/>
+          <p:nvPr/>
+        </p:nvSpPr>
+        <p:spPr>
+          <a:xfrm>
+            <a:off x="8683524" y="2891356"/>
+            <a:ext cx="2931533" cy="671957"/>
+          </a:xfrm>
+          <a:prstGeom prst="rect">
+            <a:avLst/>
+          </a:prstGeom>
+          <a:noFill/>
+        </p:spPr>
+        <p:txBody>
+          <a:bodyPr wrap="square" rtlCol="0">
+            <a:spAutoFit/>
+          </a:bodyPr>
+          <a:lstStyle/>
+          <a:p>
+            <a:r>
+              <a:rPr lang="en-US" dirty="0"/>
+              <a:t>Hydraulic head profile; releasing well in the 4th layer</a:t>
+            </a:r>
+          </a:p>
+        </p:txBody>
+      </p:sp>
       <p:pic>
         <p:nvPicPr>
-          <p:cNvPr id="4" name="Picture 3">
-            <a:extLst>
-              <a:ext uri="{FF2B5EF4-FFF2-40B4-BE49-F238E27FC236}">
-                <a16:creationId xmlns:a16="http://schemas.microsoft.com/office/drawing/2014/main" id="{E4A4CFDB-631F-454C-B9BC-3CBA0C833D27}"/>
+          <p:cNvPr id="6" name="Picture 5" descr="Background pattern&#10;&#10;Description automatically generated">
+            <a:extLst>
+              <a:ext uri="{FF2B5EF4-FFF2-40B4-BE49-F238E27FC236}">
+                <a16:creationId xmlns:a16="http://schemas.microsoft.com/office/drawing/2014/main" id="{2D340112-BC06-C249-B0A9-CD0EE8BB65D7}"/>
               </a:ext>
             </a:extLst>
           </p:cNvPr>
@@ -5205,49 +5240,14 @@
         </p:blipFill>
         <p:spPr>
           <a:xfrm>
-            <a:off x="8544378" y="1314398"/>
-            <a:ext cx="3070679" cy="1949848"/>
+            <a:off x="8083937" y="1027906"/>
+            <a:ext cx="3907619" cy="1996656"/>
           </a:xfrm>
           <a:prstGeom prst="rect">
             <a:avLst/>
           </a:prstGeom>
         </p:spPr>
       </p:pic>
-      <p:sp>
-        <p:nvSpPr>
-          <p:cNvPr id="5" name="TextBox 4">
-            <a:extLst>
-              <a:ext uri="{FF2B5EF4-FFF2-40B4-BE49-F238E27FC236}">
-                <a16:creationId xmlns:a16="http://schemas.microsoft.com/office/drawing/2014/main" id="{390C528B-4F19-4643-B8C3-211674819DD6}"/>
-              </a:ext>
-            </a:extLst>
-          </p:cNvPr>
-          <p:cNvSpPr txBox="1"/>
-          <p:nvPr/>
-        </p:nvSpPr>
-        <p:spPr>
-          <a:xfrm>
-            <a:off x="8683524" y="2891356"/>
-            <a:ext cx="2931533" cy="671957"/>
-          </a:xfrm>
-          <a:prstGeom prst="rect">
-            <a:avLst/>
-          </a:prstGeom>
-          <a:noFill/>
-        </p:spPr>
-        <p:txBody>
-          <a:bodyPr wrap="square" rtlCol="0">
-            <a:spAutoFit/>
-          </a:bodyPr>
-          <a:lstStyle/>
-          <a:p>
-            <a:r>
-              <a:rPr lang="en-US" dirty="0"/>
-              <a:t>Hydraulic head profile; injecting well in the 4th layer</a:t>
-            </a:r>
-          </a:p>
-        </p:txBody>
-      </p:sp>
     </p:spTree>
     <p:extLst>
       <p:ext uri="{BB962C8B-B14F-4D97-AF65-F5344CB8AC3E}">

</xml_diff>